<commit_message>
Updated deck 3 title slide
</commit_message>
<xml_diff>
--- a/3-NET-Standard/netcore-workshop-netstandard.pptx
+++ b/3-NET-Standard/netcore-workshop-netstandard.pptx
@@ -3,78 +3,86 @@
 <p:presentation xmlns:a="http://schemas.openxmlformats.org/drawingml/2006/main" xmlns:r="http://schemas.openxmlformats.org/officeDocument/2006/relationships" xmlns:p="http://schemas.openxmlformats.org/presentationml/2006/main" embedTrueTypeFonts="1" saveSubsetFonts="1">
   <p:sldMasterIdLst>
     <p:sldMasterId id="2147483648" r:id="rId1"/>
+    <p:sldMasterId id="2147483662" r:id="rId2"/>
   </p:sldMasterIdLst>
   <p:notesMasterIdLst>
-    <p:notesMasterId r:id="rId28"/>
+    <p:notesMasterId r:id="rId29"/>
   </p:notesMasterIdLst>
   <p:sldIdLst>
-    <p:sldId id="256" r:id="rId2"/>
-    <p:sldId id="259" r:id="rId3"/>
-    <p:sldId id="294" r:id="rId4"/>
-    <p:sldId id="295" r:id="rId5"/>
-    <p:sldId id="296" r:id="rId6"/>
-    <p:sldId id="262" r:id="rId7"/>
-    <p:sldId id="287" r:id="rId8"/>
-    <p:sldId id="263" r:id="rId9"/>
-    <p:sldId id="266" r:id="rId10"/>
-    <p:sldId id="297" r:id="rId11"/>
-    <p:sldId id="302" r:id="rId12"/>
-    <p:sldId id="292" r:id="rId13"/>
-    <p:sldId id="293" r:id="rId14"/>
-    <p:sldId id="267" r:id="rId15"/>
-    <p:sldId id="268" r:id="rId16"/>
-    <p:sldId id="300" r:id="rId17"/>
-    <p:sldId id="301" r:id="rId18"/>
-    <p:sldId id="275" r:id="rId19"/>
-    <p:sldId id="276" r:id="rId20"/>
-    <p:sldId id="277" r:id="rId21"/>
-    <p:sldId id="274" r:id="rId22"/>
-    <p:sldId id="270" r:id="rId23"/>
-    <p:sldId id="271" r:id="rId24"/>
-    <p:sldId id="273" r:id="rId25"/>
-    <p:sldId id="286" r:id="rId26"/>
-    <p:sldId id="264" r:id="rId27"/>
+    <p:sldId id="303" r:id="rId3"/>
+    <p:sldId id="259" r:id="rId4"/>
+    <p:sldId id="294" r:id="rId5"/>
+    <p:sldId id="295" r:id="rId6"/>
+    <p:sldId id="296" r:id="rId7"/>
+    <p:sldId id="262" r:id="rId8"/>
+    <p:sldId id="287" r:id="rId9"/>
+    <p:sldId id="263" r:id="rId10"/>
+    <p:sldId id="266" r:id="rId11"/>
+    <p:sldId id="297" r:id="rId12"/>
+    <p:sldId id="302" r:id="rId13"/>
+    <p:sldId id="292" r:id="rId14"/>
+    <p:sldId id="293" r:id="rId15"/>
+    <p:sldId id="267" r:id="rId16"/>
+    <p:sldId id="268" r:id="rId17"/>
+    <p:sldId id="300" r:id="rId18"/>
+    <p:sldId id="301" r:id="rId19"/>
+    <p:sldId id="275" r:id="rId20"/>
+    <p:sldId id="276" r:id="rId21"/>
+    <p:sldId id="277" r:id="rId22"/>
+    <p:sldId id="274" r:id="rId23"/>
+    <p:sldId id="270" r:id="rId24"/>
+    <p:sldId id="271" r:id="rId25"/>
+    <p:sldId id="273" r:id="rId26"/>
+    <p:sldId id="286" r:id="rId27"/>
+    <p:sldId id="264" r:id="rId28"/>
   </p:sldIdLst>
   <p:sldSz cx="12192000" cy="6858000"/>
   <p:notesSz cx="6858000" cy="9144000"/>
   <p:embeddedFontLst>
     <p:embeddedFont>
-      <p:font typeface="Calibri Light" panose="020F0302020204030204" pitchFamily="34" charset="0"/>
-      <p:regular r:id="rId29"/>
-      <p:italic r:id="rId30"/>
+      <p:font typeface="Segoe UI Semilight" panose="020B0402040204020203" pitchFamily="34" charset="0"/>
+      <p:regular r:id="rId30"/>
+      <p:italic r:id="rId31"/>
+    </p:embeddedFont>
+    <p:embeddedFont>
+      <p:font typeface="Calibri" panose="020F0502020204030204" pitchFamily="34" charset="0"/>
+      <p:regular r:id="rId32"/>
+      <p:bold r:id="rId33"/>
+      <p:italic r:id="rId34"/>
+      <p:boldItalic r:id="rId35"/>
+    </p:embeddedFont>
+    <p:embeddedFont>
+      <p:font typeface="Segoe UI Semibold" panose="020B0702040204020203" pitchFamily="34" charset="0"/>
+      <p:bold r:id="rId36"/>
+      <p:boldItalic r:id="rId37"/>
+    </p:embeddedFont>
+    <p:embeddedFont>
+      <p:font typeface="Segoe UI Light" panose="020B0502040204020203" pitchFamily="34" charset="0"/>
+      <p:regular r:id="rId38"/>
+      <p:italic r:id="rId39"/>
     </p:embeddedFont>
     <p:embeddedFont>
       <p:font typeface="Segoe UI" panose="020B0502040204020203" pitchFamily="34" charset="0"/>
-      <p:regular r:id="rId31"/>
-      <p:bold r:id="rId32"/>
-      <p:italic r:id="rId33"/>
-      <p:boldItalic r:id="rId34"/>
+      <p:regular r:id="rId40"/>
+      <p:bold r:id="rId41"/>
+      <p:italic r:id="rId42"/>
+      <p:boldItalic r:id="rId43"/>
     </p:embeddedFont>
     <p:embeddedFont>
-      <p:font typeface="Segoe UI Semilight" panose="020B0402040204020203" pitchFamily="34" charset="0"/>
-      <p:regular r:id="rId35"/>
-      <p:italic r:id="rId36"/>
+      <p:font typeface="Calibri Light" panose="020F0302020204030204" pitchFamily="34" charset="0"/>
+      <p:regular r:id="rId44"/>
+      <p:italic r:id="rId45"/>
     </p:embeddedFont>
     <p:embeddedFont>
-      <p:font typeface="Calibri" panose="020F0502020204030204" pitchFamily="34" charset="0"/>
-      <p:regular r:id="rId37"/>
-      <p:bold r:id="rId38"/>
-      <p:italic r:id="rId39"/>
-      <p:boldItalic r:id="rId40"/>
+      <p:font typeface="Righteous" panose="020B0604020202020204" charset="0"/>
+      <p:regular r:id="rId46"/>
     </p:embeddedFont>
     <p:embeddedFont>
-      <p:font typeface="Segoe UI Semibold" panose="020B0702040204020203" pitchFamily="34" charset="0"/>
-      <p:bold r:id="rId41"/>
-      <p:boldItalic r:id="rId42"/>
-    </p:embeddedFont>
-    <p:embeddedFont>
-      <p:font typeface="Righteous" panose="02010506000000020000" pitchFamily="2" charset="0"/>
-      <p:regular r:id="rId43"/>
-    </p:embeddedFont>
-    <p:embeddedFont>
-      <p:font typeface="Segoe UI Light" panose="020B0502040204020203" pitchFamily="34" charset="0"/>
-      <p:regular r:id="rId44"/>
-      <p:italic r:id="rId45"/>
+      <p:font typeface="Consolas" panose="020B0609020204030204" pitchFamily="49" charset="0"/>
+      <p:regular r:id="rId47"/>
+      <p:bold r:id="rId48"/>
+      <p:italic r:id="rId49"/>
+      <p:boldItalic r:id="rId50"/>
     </p:embeddedFont>
   </p:embeddedFontLst>
   <p:defaultTextStyle>
@@ -177,7 +185,7 @@
       <p14:sectionLst xmlns:p14="http://schemas.microsoft.com/office/powerpoint/2010/main">
         <p14:section name="Content" id="{474EC64E-86FA-4930-9910-1942B746F4D0}">
           <p14:sldIdLst>
-            <p14:sldId id="256"/>
+            <p14:sldId id="303"/>
             <p14:sldId id="259"/>
             <p14:sldId id="294"/>
             <p14:sldId id="295"/>
@@ -304,7 +312,7 @@
           <a:p>
             <a:fld id="{148BFE7F-F400-4DD9-B236-B1C0D7AE84D3}" type="datetimeFigureOut">
               <a:rPr lang="en-US" smtClean="0"/>
-              <a:t>8/22/2017</a:t>
+              <a:t>9/17/2017</a:t>
             </a:fld>
             <a:endParaRPr lang="en-US"/>
           </a:p>
@@ -615,18 +623,18 @@
           <a:bodyPr/>
           <a:lstStyle/>
           <a:p>
-            <a:endParaRPr lang="en-US"/>
+            <a:endParaRPr lang="en-US" dirty="0"/>
           </a:p>
         </p:txBody>
       </p:sp>
       <p:sp>
         <p:nvSpPr>
-          <p:cNvPr id="4" name="Slide Number Placeholder 3"/>
+          <p:cNvPr id="4" name="Header Placeholder 3"/>
           <p:cNvSpPr>
             <a:spLocks noGrp="1"/>
           </p:cNvSpPr>
           <p:nvPr>
-            <p:ph type="sldNum" sz="quarter" idx="10"/>
+            <p:ph type="hdr" sz="quarter" idx="10"/>
           </p:nvPr>
         </p:nvSpPr>
         <p:spPr/>
@@ -634,18 +642,309 @@
           <a:bodyPr/>
           <a:lstStyle/>
           <a:p>
-            <a:fld id="{8CC4A70A-AB43-432D-BC12-AA40E3A734CF}" type="slidenum">
-              <a:rPr lang="en-US" smtClean="0"/>
+            <a:pPr marL="0" marR="0" lvl="0" indent="0" algn="l" defTabSz="932742" rtl="0" eaLnBrk="1" fontAlgn="auto" latinLnBrk="0" hangingPunct="1">
+              <a:lnSpc>
+                <a:spcPct val="100000"/>
+              </a:lnSpc>
+              <a:spcBef>
+                <a:spcPts val="0"/>
+              </a:spcBef>
+              <a:spcAft>
+                <a:spcPts val="0"/>
+              </a:spcAft>
+              <a:buClrTx/>
+              <a:buSzTx/>
+              <a:buFontTx/>
+              <a:buNone/>
+              <a:tabLst/>
+              <a:defRPr/>
+            </a:pPr>
+            <a:r>
+              <a:rPr kumimoji="0" lang="en-US" sz="1200" b="0" i="0" u="none" strike="noStrike" kern="1200" cap="none" spc="0" normalizeH="0" baseline="0" noProof="0">
+                <a:ln>
+                  <a:noFill/>
+                </a:ln>
+                <a:solidFill>
+                  <a:prstClr val="black"/>
+                </a:solidFill>
+                <a:effectLst/>
+                <a:uLnTx/>
+                <a:uFillTx/>
+                <a:latin typeface="Segoe UI" pitchFamily="34" charset="0"/>
+                <a:ea typeface="+mn-ea"/>
+                <a:cs typeface="+mn-cs"/>
+              </a:rPr>
+              <a:t>Microsoft Ignite 2016</a:t>
+            </a:r>
+            <a:endParaRPr kumimoji="0" lang="en-US" sz="1200" b="0" i="0" u="none" strike="noStrike" kern="1200" cap="none" spc="0" normalizeH="0" baseline="0" noProof="0" dirty="0">
+              <a:ln>
+                <a:noFill/>
+              </a:ln>
+              <a:solidFill>
+                <a:prstClr val="black"/>
+              </a:solidFill>
+              <a:effectLst/>
+              <a:uLnTx/>
+              <a:uFillTx/>
+              <a:latin typeface="Segoe UI" pitchFamily="34" charset="0"/>
+              <a:ea typeface="+mn-ea"/>
+              <a:cs typeface="+mn-cs"/>
+            </a:endParaRPr>
+          </a:p>
+        </p:txBody>
+      </p:sp>
+      <p:sp>
+        <p:nvSpPr>
+          <p:cNvPr id="5" name="Footer Placeholder 4"/>
+          <p:cNvSpPr>
+            <a:spLocks noGrp="1"/>
+          </p:cNvSpPr>
+          <p:nvPr>
+            <p:ph type="ftr" sz="quarter" idx="11"/>
+          </p:nvPr>
+        </p:nvSpPr>
+        <p:spPr/>
+        <p:txBody>
+          <a:bodyPr/>
+          <a:lstStyle/>
+          <a:p>
+            <a:pPr marL="571500" marR="0" lvl="0" indent="0" algn="l" defTabSz="914099" rtl="0" eaLnBrk="0" fontAlgn="auto" latinLnBrk="0" hangingPunct="0">
+              <a:lnSpc>
+                <a:spcPct val="100000"/>
+              </a:lnSpc>
+              <a:spcBef>
+                <a:spcPts val="0"/>
+              </a:spcBef>
+              <a:spcAft>
+                <a:spcPts val="0"/>
+              </a:spcAft>
+              <a:buClrTx/>
+              <a:buSzTx/>
+              <a:buFontTx/>
+              <a:buNone/>
+              <a:tabLst/>
+              <a:defRPr/>
+            </a:pPr>
+            <a:r>
+              <a:rPr kumimoji="0" lang="en-US" sz="400" b="0" i="0" u="none" strike="noStrike" kern="1200" cap="none" spc="0" normalizeH="0" baseline="0" noProof="0">
+                <a:ln>
+                  <a:noFill/>
+                </a:ln>
+                <a:gradFill>
+                  <a:gsLst>
+                    <a:gs pos="0">
+                      <a:prstClr val="black"/>
+                    </a:gs>
+                    <a:gs pos="100000">
+                      <a:prstClr val="black"/>
+                    </a:gs>
+                  </a:gsLst>
+                  <a:lin ang="5400000" scaled="0"/>
+                </a:gradFill>
+                <a:effectLst/>
+                <a:uLnTx/>
+                <a:uFillTx/>
+                <a:latin typeface="Segoe UI" pitchFamily="34" charset="0"/>
+                <a:ea typeface="Segoe UI" pitchFamily="34" charset="0"/>
+                <a:cs typeface="Segoe UI" pitchFamily="34" charset="0"/>
+              </a:rPr>
+              <a:t>© 2016 Microsoft Corporation. All rights reserved. MICROSOFT MAKES NO WARRANTIES, EXPRESS, IMPLIED OR STATUTORY, AS TO THE INFORMATION IN THIS PRESENTATION.</a:t>
+            </a:r>
+            <a:endParaRPr kumimoji="0" lang="en-US" sz="400" b="0" i="0" u="none" strike="noStrike" kern="1200" cap="none" spc="0" normalizeH="0" baseline="0" noProof="0" dirty="0">
+              <a:ln>
+                <a:noFill/>
+              </a:ln>
+              <a:gradFill>
+                <a:gsLst>
+                  <a:gs pos="0">
+                    <a:prstClr val="black"/>
+                  </a:gs>
+                  <a:gs pos="100000">
+                    <a:prstClr val="black"/>
+                  </a:gs>
+                </a:gsLst>
+                <a:lin ang="5400000" scaled="0"/>
+              </a:gradFill>
+              <a:effectLst/>
+              <a:uLnTx/>
+              <a:uFillTx/>
+              <a:latin typeface="Segoe UI" pitchFamily="34" charset="0"/>
+              <a:ea typeface="Segoe UI" pitchFamily="34" charset="0"/>
+              <a:cs typeface="Segoe UI" pitchFamily="34" charset="0"/>
+            </a:endParaRPr>
+          </a:p>
+        </p:txBody>
+      </p:sp>
+      <p:sp>
+        <p:nvSpPr>
+          <p:cNvPr id="6" name="Date Placeholder 5"/>
+          <p:cNvSpPr>
+            <a:spLocks noGrp="1"/>
+          </p:cNvSpPr>
+          <p:nvPr>
+            <p:ph type="dt" idx="12"/>
+          </p:nvPr>
+        </p:nvSpPr>
+        <p:spPr/>
+        <p:txBody>
+          <a:bodyPr/>
+          <a:lstStyle/>
+          <a:p>
+            <a:pPr marL="0" marR="0" lvl="0" indent="0" algn="r" defTabSz="932742" rtl="0" eaLnBrk="1" fontAlgn="auto" latinLnBrk="0" hangingPunct="1">
+              <a:lnSpc>
+                <a:spcPct val="100000"/>
+              </a:lnSpc>
+              <a:spcBef>
+                <a:spcPts val="0"/>
+              </a:spcBef>
+              <a:spcAft>
+                <a:spcPts val="0"/>
+              </a:spcAft>
+              <a:buClrTx/>
+              <a:buSzTx/>
+              <a:buFontTx/>
+              <a:buNone/>
+              <a:tabLst/>
+              <a:defRPr/>
+            </a:pPr>
+            <a:fld id="{38EEC551-8CDA-4EB6-89BB-2A86C9F091C8}" type="datetime8">
+              <a:rPr kumimoji="0" lang="en-US" sz="1200" b="0" i="0" u="none" strike="noStrike" kern="1200" cap="none" spc="0" normalizeH="0" baseline="0" noProof="0" smtClean="0">
+                <a:ln>
+                  <a:noFill/>
+                </a:ln>
+                <a:solidFill>
+                  <a:prstClr val="black"/>
+                </a:solidFill>
+                <a:effectLst/>
+                <a:uLnTx/>
+                <a:uFillTx/>
+                <a:latin typeface="Segoe UI" pitchFamily="34" charset="0"/>
+                <a:ea typeface="+mn-ea"/>
+                <a:cs typeface="+mn-cs"/>
+              </a:rPr>
+              <a:pPr marL="0" marR="0" lvl="0" indent="0" algn="r" defTabSz="932742" rtl="0" eaLnBrk="1" fontAlgn="auto" latinLnBrk="0" hangingPunct="1">
+                <a:lnSpc>
+                  <a:spcPct val="100000"/>
+                </a:lnSpc>
+                <a:spcBef>
+                  <a:spcPts val="0"/>
+                </a:spcBef>
+                <a:spcAft>
+                  <a:spcPts val="0"/>
+                </a:spcAft>
+                <a:buClrTx/>
+                <a:buSzTx/>
+                <a:buFontTx/>
+                <a:buNone/>
+                <a:tabLst/>
+                <a:defRPr/>
+              </a:pPr>
+              <a:t>9/17/2017 4:31 AM</a:t>
+            </a:fld>
+            <a:endParaRPr kumimoji="0" lang="en-US" sz="1200" b="0" i="0" u="none" strike="noStrike" kern="1200" cap="none" spc="0" normalizeH="0" baseline="0" noProof="0" dirty="0">
+              <a:ln>
+                <a:noFill/>
+              </a:ln>
+              <a:solidFill>
+                <a:prstClr val="black"/>
+              </a:solidFill>
+              <a:effectLst/>
+              <a:uLnTx/>
+              <a:uFillTx/>
+              <a:latin typeface="Segoe UI" pitchFamily="34" charset="0"/>
+              <a:ea typeface="+mn-ea"/>
+              <a:cs typeface="+mn-cs"/>
+            </a:endParaRPr>
+          </a:p>
+        </p:txBody>
+      </p:sp>
+      <p:sp>
+        <p:nvSpPr>
+          <p:cNvPr id="7" name="Slide Number Placeholder 6"/>
+          <p:cNvSpPr>
+            <a:spLocks noGrp="1"/>
+          </p:cNvSpPr>
+          <p:nvPr>
+            <p:ph type="sldNum" sz="quarter" idx="13"/>
+          </p:nvPr>
+        </p:nvSpPr>
+        <p:spPr/>
+        <p:txBody>
+          <a:bodyPr/>
+          <a:lstStyle/>
+          <a:p>
+            <a:pPr marL="0" marR="0" lvl="0" indent="0" algn="r" defTabSz="932742" rtl="0" eaLnBrk="1" fontAlgn="auto" latinLnBrk="0" hangingPunct="1">
+              <a:lnSpc>
+                <a:spcPct val="100000"/>
+              </a:lnSpc>
+              <a:spcBef>
+                <a:spcPts val="0"/>
+              </a:spcBef>
+              <a:spcAft>
+                <a:spcPts val="0"/>
+              </a:spcAft>
+              <a:buClrTx/>
+              <a:buSzTx/>
+              <a:buFontTx/>
+              <a:buNone/>
+              <a:tabLst/>
+              <a:defRPr/>
+            </a:pPr>
+            <a:fld id="{B4008EB6-D09E-4580-8CD6-DDB14511944F}" type="slidenum">
+              <a:rPr kumimoji="0" lang="en-US" sz="1200" b="0" i="0" u="none" strike="noStrike" kern="1200" cap="none" spc="0" normalizeH="0" baseline="0" noProof="0" smtClean="0">
+                <a:ln>
+                  <a:noFill/>
+                </a:ln>
+                <a:solidFill>
+                  <a:prstClr val="black"/>
+                </a:solidFill>
+                <a:effectLst/>
+                <a:uLnTx/>
+                <a:uFillTx/>
+                <a:latin typeface="Segoe UI" pitchFamily="34" charset="0"/>
+                <a:ea typeface="+mn-ea"/>
+                <a:cs typeface="+mn-cs"/>
+              </a:rPr>
+              <a:pPr marL="0" marR="0" lvl="0" indent="0" algn="r" defTabSz="932742" rtl="0" eaLnBrk="1" fontAlgn="auto" latinLnBrk="0" hangingPunct="1">
+                <a:lnSpc>
+                  <a:spcPct val="100000"/>
+                </a:lnSpc>
+                <a:spcBef>
+                  <a:spcPts val="0"/>
+                </a:spcBef>
+                <a:spcAft>
+                  <a:spcPts val="0"/>
+                </a:spcAft>
+                <a:buClrTx/>
+                <a:buSzTx/>
+                <a:buFontTx/>
+                <a:buNone/>
+                <a:tabLst/>
+                <a:defRPr/>
+              </a:pPr>
               <a:t>1</a:t>
             </a:fld>
-            <a:endParaRPr lang="en-US"/>
+            <a:endParaRPr kumimoji="0" lang="en-US" sz="1200" b="0" i="0" u="none" strike="noStrike" kern="1200" cap="none" spc="0" normalizeH="0" baseline="0" noProof="0" dirty="0">
+              <a:ln>
+                <a:noFill/>
+              </a:ln>
+              <a:solidFill>
+                <a:prstClr val="black"/>
+              </a:solidFill>
+              <a:effectLst/>
+              <a:uLnTx/>
+              <a:uFillTx/>
+              <a:latin typeface="Segoe UI" pitchFamily="34" charset="0"/>
+              <a:ea typeface="+mn-ea"/>
+              <a:cs typeface="+mn-cs"/>
+            </a:endParaRPr>
           </a:p>
         </p:txBody>
       </p:sp>
     </p:spTree>
     <p:extLst>
       <p:ext uri="{BB962C8B-B14F-4D97-AF65-F5344CB8AC3E}">
-        <p14:creationId xmlns:p14="http://schemas.microsoft.com/office/powerpoint/2010/main" val="4040438784"/>
+        <p14:creationId xmlns:p14="http://schemas.microsoft.com/office/powerpoint/2010/main" val="3426023779"/>
       </p:ext>
     </p:extLst>
   </p:cSld>
@@ -870,7 +1169,7 @@
                 </a:solidFill>
               </a:rPr>
               <a:pPr/>
-              <a:t>8/22/2017 12:11 PM</a:t>
+              <a:t>9/17/2017 4:31 AM</a:t>
             </a:fld>
             <a:endParaRPr lang="en-US" dirty="0">
               <a:solidFill>
@@ -1353,7 +1652,7 @@
                 <a:tabLst/>
                 <a:defRPr/>
               </a:pPr>
-              <a:t>8/22/2017 12:11 PM</a:t>
+              <a:t>9/17/2017 4:31 AM</a:t>
             </a:fld>
             <a:endParaRPr kumimoji="0" lang="en-US" sz="1200" b="0" i="0" u="none" strike="noStrike" kern="1200" cap="none" spc="0" normalizeH="0" baseline="0" noProof="0" dirty="0">
               <a:ln>
@@ -1606,7 +1905,7 @@
           <a:p>
             <a:fld id="{38EEC551-8CDA-4EB6-89BB-2A86C9F091C8}" type="datetime8">
               <a:rPr lang="en-US" smtClean="0"/>
-              <a:t>8/22/2017 12:11 PM</a:t>
+              <a:t>9/17/2017 4:31 AM</a:t>
             </a:fld>
             <a:endParaRPr lang="en-US" dirty="0"/>
           </a:p>
@@ -1787,7 +2086,7 @@
           <a:p>
             <a:fld id="{38EEC551-8CDA-4EB6-89BB-2A86C9F091C8}" type="datetime8">
               <a:rPr lang="en-US" smtClean="0"/>
-              <a:t>8/22/2017 12:11 PM</a:t>
+              <a:t>9/17/2017 4:31 AM</a:t>
             </a:fld>
             <a:endParaRPr lang="en-US" dirty="0"/>
           </a:p>
@@ -1968,7 +2267,7 @@
           <a:p>
             <a:fld id="{38EEC551-8CDA-4EB6-89BB-2A86C9F091C8}" type="datetime8">
               <a:rPr lang="en-US" smtClean="0"/>
-              <a:t>8/22/2017 12:11 PM</a:t>
+              <a:t>9/17/2017 4:31 AM</a:t>
             </a:fld>
             <a:endParaRPr lang="en-US" dirty="0"/>
           </a:p>
@@ -2149,7 +2448,7 @@
           <a:p>
             <a:fld id="{38EEC551-8CDA-4EB6-89BB-2A86C9F091C8}" type="datetime8">
               <a:rPr lang="en-US" smtClean="0"/>
-              <a:t>8/22/2017 12:11 PM</a:t>
+              <a:t>9/17/2017 4:31 AM</a:t>
             </a:fld>
             <a:endParaRPr lang="en-US" dirty="0"/>
           </a:p>
@@ -2330,7 +2629,7 @@
           <a:p>
             <a:fld id="{38EEC551-8CDA-4EB6-89BB-2A86C9F091C8}" type="datetime8">
               <a:rPr lang="en-US" smtClean="0"/>
-              <a:t>8/22/2017 12:11 PM</a:t>
+              <a:t>9/17/2017 4:31 AM</a:t>
             </a:fld>
             <a:endParaRPr lang="en-US" dirty="0"/>
           </a:p>
@@ -2686,7 +2985,7 @@
           <a:p>
             <a:fld id="{38EEC551-8CDA-4EB6-89BB-2A86C9F091C8}" type="datetime8">
               <a:rPr lang="en-US" smtClean="0"/>
-              <a:t>8/22/2017 12:11 PM</a:t>
+              <a:t>9/17/2017 4:31 AM</a:t>
             </a:fld>
             <a:endParaRPr lang="en-US" dirty="0"/>
           </a:p>
@@ -2867,7 +3166,7 @@
           <a:p>
             <a:fld id="{38EEC551-8CDA-4EB6-89BB-2A86C9F091C8}" type="datetime8">
               <a:rPr lang="en-US" smtClean="0"/>
-              <a:t>8/22/2017 12:11 PM</a:t>
+              <a:t>9/17/2017 4:31 AM</a:t>
             </a:fld>
             <a:endParaRPr lang="en-US" dirty="0"/>
           </a:p>
@@ -3048,7 +3347,7 @@
           <a:p>
             <a:fld id="{38EEC551-8CDA-4EB6-89BB-2A86C9F091C8}" type="datetime8">
               <a:rPr lang="en-US" smtClean="0"/>
-              <a:t>8/22/2017 12:11 PM</a:t>
+              <a:t>9/17/2017 4:31 AM</a:t>
             </a:fld>
             <a:endParaRPr lang="en-US" dirty="0"/>
           </a:p>
@@ -3229,7 +3528,7 @@
           <a:p>
             <a:fld id="{38EEC551-8CDA-4EB6-89BB-2A86C9F091C8}" type="datetime8">
               <a:rPr lang="en-US" smtClean="0"/>
-              <a:t>8/22/2017 12:11 PM</a:t>
+              <a:t>9/17/2017 4:31 AM</a:t>
             </a:fld>
             <a:endParaRPr lang="en-US" dirty="0"/>
           </a:p>
@@ -3410,7 +3709,7 @@
           <a:p>
             <a:fld id="{38EEC551-8CDA-4EB6-89BB-2A86C9F091C8}" type="datetime8">
               <a:rPr lang="en-US" smtClean="0"/>
-              <a:t>8/22/2017 12:11 PM</a:t>
+              <a:t>9/17/2017 4:31 AM</a:t>
             </a:fld>
             <a:endParaRPr lang="en-US" dirty="0"/>
           </a:p>
@@ -3591,7 +3890,7 @@
           <a:p>
             <a:fld id="{38EEC551-8CDA-4EB6-89BB-2A86C9F091C8}" type="datetime8">
               <a:rPr lang="en-US" smtClean="0"/>
-              <a:t>8/22/2017 12:11 PM</a:t>
+              <a:t>9/17/2017 4:31 AM</a:t>
             </a:fld>
             <a:endParaRPr lang="en-US" dirty="0"/>
           </a:p>
@@ -3772,7 +4071,7 @@
           <a:p>
             <a:fld id="{38EEC551-8CDA-4EB6-89BB-2A86C9F091C8}" type="datetime8">
               <a:rPr lang="en-US" smtClean="0"/>
-              <a:t>8/22/2017 12:11 PM</a:t>
+              <a:t>9/17/2017 4:31 AM</a:t>
             </a:fld>
             <a:endParaRPr lang="en-US" dirty="0"/>
           </a:p>
@@ -4478,7 +4777,7 @@
           <a:p>
             <a:fld id="{38EEC551-8CDA-4EB6-89BB-2A86C9F091C8}" type="datetime8">
               <a:rPr lang="en-US" smtClean="0"/>
-              <a:t>8/22/2017 12:11 PM</a:t>
+              <a:t>9/17/2017 4:31 AM</a:t>
             </a:fld>
             <a:endParaRPr lang="en-US" dirty="0"/>
           </a:p>
@@ -4742,7 +5041,7 @@
                 <a:tabLst/>
                 <a:defRPr/>
               </a:pPr>
-              <a:t>8/22/2017 12:11 PM</a:t>
+              <a:t>9/17/2017 4:31 AM</a:t>
             </a:fld>
             <a:endParaRPr kumimoji="0" lang="en-US" sz="1200" b="0" i="0" u="none" strike="noStrike" kern="1200" cap="none" spc="0" normalizeH="0" baseline="0" noProof="0">
               <a:ln>
@@ -4988,7 +5287,7 @@
                 </a:solidFill>
               </a:rPr>
               <a:pPr/>
-              <a:t>8/22/2017 12:11 PM</a:t>
+              <a:t>9/17/2017 4:30 AM</a:t>
             </a:fld>
             <a:endParaRPr lang="en-US" dirty="0">
               <a:solidFill>
@@ -5174,7 +5473,7 @@
                 </a:solidFill>
               </a:rPr>
               <a:pPr/>
-              <a:t>8/22/2017 12:11 PM</a:t>
+              <a:t>9/17/2017 4:31 AM</a:t>
             </a:fld>
             <a:endParaRPr lang="en-US" dirty="0">
               <a:solidFill>
@@ -5378,7 +5677,7 @@
           <a:p>
             <a:fld id="{AFAAA849-1D6E-40B2-B057-39C83678EF33}" type="datetimeFigureOut">
               <a:rPr lang="en-US" smtClean="0"/>
-              <a:t>8/22/2017</a:t>
+              <a:t>9/17/2017</a:t>
             </a:fld>
             <a:endParaRPr lang="en-US"/>
           </a:p>
@@ -5576,7 +5875,7 @@
           <a:p>
             <a:fld id="{AFAAA849-1D6E-40B2-B057-39C83678EF33}" type="datetimeFigureOut">
               <a:rPr lang="en-US" smtClean="0"/>
-              <a:t>8/22/2017</a:t>
+              <a:t>9/17/2017</a:t>
             </a:fld>
             <a:endParaRPr lang="en-US"/>
           </a:p>
@@ -5784,7 +6083,7 @@
           <a:p>
             <a:fld id="{AFAAA849-1D6E-40B2-B057-39C83678EF33}" type="datetimeFigureOut">
               <a:rPr lang="en-US" smtClean="0"/>
-              <a:t>8/22/2017</a:t>
+              <a:t>9/17/2017</a:t>
             </a:fld>
             <a:endParaRPr lang="en-US"/>
           </a:p>
@@ -6150,6 +6449,900 @@
 </p:sldLayout>
 </file>
 
+<file path=ppt/slideLayouts/slideLayout14.xml><?xml version="1.0" encoding="utf-8"?>
+<p:sldLayout xmlns:a="http://schemas.openxmlformats.org/drawingml/2006/main" xmlns:r="http://schemas.openxmlformats.org/officeDocument/2006/relationships" xmlns:p="http://schemas.openxmlformats.org/presentationml/2006/main" preserve="1" userDrawn="1">
+  <p:cSld name="Title Slide">
+    <p:bg>
+      <p:bgPr>
+        <a:solidFill>
+          <a:schemeClr val="bg1"/>
+        </a:solidFill>
+        <a:effectLst/>
+      </p:bgPr>
+    </p:bg>
+    <p:spTree>
+      <p:nvGrpSpPr>
+        <p:cNvPr id="1" name=""/>
+        <p:cNvGrpSpPr/>
+        <p:nvPr/>
+      </p:nvGrpSpPr>
+      <p:grpSpPr>
+        <a:xfrm>
+          <a:off x="0" y="0"/>
+          <a:ext cx="0" cy="0"/>
+          <a:chOff x="0" y="0"/>
+          <a:chExt cx="0" cy="0"/>
+        </a:xfrm>
+      </p:grpSpPr>
+      <p:sp>
+        <p:nvSpPr>
+          <p:cNvPr id="9" name="Title 1"/>
+          <p:cNvSpPr>
+            <a:spLocks noGrp="1"/>
+          </p:cNvSpPr>
+          <p:nvPr>
+            <p:ph type="title" hasCustomPrompt="1"/>
+          </p:nvPr>
+        </p:nvSpPr>
+        <p:spPr>
+          <a:xfrm>
+            <a:off x="269302" y="2084187"/>
+            <a:ext cx="8964185" cy="1793090"/>
+          </a:xfrm>
+          <a:noFill/>
+        </p:spPr>
+        <p:txBody>
+          <a:bodyPr lIns="146304" tIns="91440" rIns="146304" bIns="91440" anchor="t" anchorCtr="0"/>
+          <a:lstStyle>
+            <a:lvl1pPr>
+              <a:defRPr sz="5294" spc="-98" baseline="0">
+                <a:gradFill>
+                  <a:gsLst>
+                    <a:gs pos="62564">
+                      <a:schemeClr val="tx1"/>
+                    </a:gs>
+                    <a:gs pos="55000">
+                      <a:schemeClr val="tx1"/>
+                    </a:gs>
+                  </a:gsLst>
+                  <a:lin ang="5400000" scaled="0"/>
+                </a:gradFill>
+              </a:defRPr>
+            </a:lvl1pPr>
+          </a:lstStyle>
+          <a:p>
+            <a:r>
+              <a:rPr lang="en-US" dirty="0"/>
+              <a:t>Presentation title</a:t>
+            </a:r>
+          </a:p>
+        </p:txBody>
+      </p:sp>
+      <p:sp>
+        <p:nvSpPr>
+          <p:cNvPr id="5" name="Text Placeholder 4"/>
+          <p:cNvSpPr>
+            <a:spLocks noGrp="1"/>
+          </p:cNvSpPr>
+          <p:nvPr>
+            <p:ph type="body" sz="quarter" idx="12" hasCustomPrompt="1"/>
+          </p:nvPr>
+        </p:nvSpPr>
+        <p:spPr>
+          <a:xfrm>
+            <a:off x="269301" y="3878574"/>
+            <a:ext cx="7171337" cy="1792326"/>
+          </a:xfrm>
+          <a:noFill/>
+        </p:spPr>
+        <p:txBody>
+          <a:bodyPr lIns="164592" tIns="109728" rIns="164592" bIns="109728">
+            <a:noAutofit/>
+          </a:bodyPr>
+          <a:lstStyle>
+            <a:lvl1pPr marL="0" indent="0">
+              <a:spcBef>
+                <a:spcPts val="0"/>
+              </a:spcBef>
+              <a:buNone/>
+              <a:defRPr sz="3137" spc="0" baseline="0">
+                <a:gradFill>
+                  <a:gsLst>
+                    <a:gs pos="91000">
+                      <a:schemeClr val="tx1"/>
+                    </a:gs>
+                    <a:gs pos="0">
+                      <a:schemeClr val="tx1"/>
+                    </a:gs>
+                  </a:gsLst>
+                  <a:lin ang="5400000" scaled="0"/>
+                </a:gradFill>
+                <a:latin typeface="+mn-lt"/>
+              </a:defRPr>
+            </a:lvl1pPr>
+          </a:lstStyle>
+          <a:p>
+            <a:pPr lvl="0"/>
+            <a:r>
+              <a:rPr lang="en-US" dirty="0"/>
+              <a:t>Speaker name</a:t>
+            </a:r>
+          </a:p>
+        </p:txBody>
+      </p:sp>
+      <p:pic>
+        <p:nvPicPr>
+          <p:cNvPr id="6" name="MS logo white - EMF"/>
+          <p:cNvPicPr>
+            <a:picLocks noChangeAspect="1"/>
+          </p:cNvPicPr>
+          <p:nvPr userDrawn="1"/>
+        </p:nvPicPr>
+        <p:blipFill>
+          <a:blip r:embed="rId2" cstate="screen">
+            <a:extLst>
+              <a:ext uri="{28A0092B-C50C-407E-A947-70E740481C1C}">
+                <a14:useLocalDpi xmlns:a14="http://schemas.microsoft.com/office/drawing/2010/main"/>
+              </a:ext>
+            </a:extLst>
+          </a:blip>
+          <a:stretch>
+            <a:fillRect/>
+          </a:stretch>
+        </p:blipFill>
+        <p:spPr bwMode="black">
+          <a:xfrm>
+            <a:off x="451632" y="470067"/>
+            <a:ext cx="1423303" cy="304828"/>
+          </a:xfrm>
+          <a:prstGeom prst="rect">
+            <a:avLst/>
+          </a:prstGeom>
+        </p:spPr>
+      </p:pic>
+      <p:pic>
+        <p:nvPicPr>
+          <p:cNvPr id="8" name="Picture 7"/>
+          <p:cNvPicPr>
+            <a:picLocks noChangeAspect="1"/>
+          </p:cNvPicPr>
+          <p:nvPr userDrawn="1"/>
+        </p:nvPicPr>
+        <p:blipFill rotWithShape="1">
+          <a:blip r:embed="rId3" cstate="hqprint">
+            <a:extLst>
+              <a:ext uri="{28A0092B-C50C-407E-A947-70E740481C1C}">
+                <a14:useLocalDpi xmlns:a14="http://schemas.microsoft.com/office/drawing/2010/main"/>
+              </a:ext>
+            </a:extLst>
+          </a:blip>
+          <a:srcRect l="-33002"/>
+          <a:stretch/>
+        </p:blipFill>
+        <p:spPr>
+          <a:xfrm>
+            <a:off x="7599824" y="4985515"/>
+            <a:ext cx="4592176" cy="1872486"/>
+          </a:xfrm>
+          <a:prstGeom prst="rect">
+            <a:avLst/>
+          </a:prstGeom>
+        </p:spPr>
+      </p:pic>
+      <p:sp>
+        <p:nvSpPr>
+          <p:cNvPr id="7" name="Text Placeholder 3"/>
+          <p:cNvSpPr>
+            <a:spLocks noGrp="1"/>
+          </p:cNvSpPr>
+          <p:nvPr>
+            <p:ph type="body" sz="quarter" idx="15" hasCustomPrompt="1"/>
+          </p:nvPr>
+        </p:nvSpPr>
+        <p:spPr>
+          <a:xfrm>
+            <a:off x="9233488" y="291069"/>
+            <a:ext cx="2689274" cy="452654"/>
+          </a:xfrm>
+        </p:spPr>
+        <p:txBody>
+          <a:bodyPr/>
+          <a:lstStyle>
+            <a:lvl1pPr marL="0" marR="0" indent="0" algn="r" defTabSz="914367" rtl="0" eaLnBrk="1" fontAlgn="auto" latinLnBrk="0" hangingPunct="1">
+              <a:lnSpc>
+                <a:spcPct val="90000"/>
+              </a:lnSpc>
+              <a:spcBef>
+                <a:spcPct val="20000"/>
+              </a:spcBef>
+              <a:spcAft>
+                <a:spcPts val="0"/>
+              </a:spcAft>
+              <a:buClrTx/>
+              <a:buSzPct val="90000"/>
+              <a:buFont typeface="Arial" pitchFamily="34" charset="0"/>
+              <a:buNone/>
+              <a:tabLst/>
+              <a:defRPr lang="en-US" sz="1961" kern="1200" spc="0" baseline="0" dirty="0">
+                <a:gradFill>
+                  <a:gsLst>
+                    <a:gs pos="1250">
+                      <a:schemeClr val="tx1"/>
+                    </a:gs>
+                    <a:gs pos="100000">
+                      <a:schemeClr val="tx1"/>
+                    </a:gs>
+                  </a:gsLst>
+                  <a:lin ang="5400000" scaled="0"/>
+                </a:gradFill>
+                <a:latin typeface="+mn-lt"/>
+                <a:ea typeface="+mn-ea"/>
+                <a:cs typeface="+mn-cs"/>
+              </a:defRPr>
+            </a:lvl1pPr>
+          </a:lstStyle>
+          <a:p>
+            <a:pPr lvl="0"/>
+            <a:r>
+              <a:rPr lang="en-US" dirty="0"/>
+              <a:t>Session Code</a:t>
+            </a:r>
+          </a:p>
+        </p:txBody>
+      </p:sp>
+    </p:spTree>
+    <p:extLst>
+      <p:ext uri="{BB962C8B-B14F-4D97-AF65-F5344CB8AC3E}">
+        <p14:creationId xmlns:p14="http://schemas.microsoft.com/office/powerpoint/2010/main" val="339781498"/>
+      </p:ext>
+    </p:extLst>
+  </p:cSld>
+  <p:clrMapOvr>
+    <a:overrideClrMapping bg1="dk1" tx1="lt1" bg2="dk2" tx2="lt2" accent1="accent1" accent2="accent2" accent3="accent3" accent4="accent4" accent5="accent5" accent6="accent6" hlink="hlink" folHlink="folHlink"/>
+  </p:clrMapOvr>
+  <mc:AlternateContent xmlns:mc="http://schemas.openxmlformats.org/markup-compatibility/2006" xmlns:p14="http://schemas.microsoft.com/office/powerpoint/2010/main">
+    <mc:Choice Requires="p14">
+      <p:transition spd="med" p14:dur="700">
+        <p:fade/>
+      </p:transition>
+    </mc:Choice>
+    <mc:Fallback xmlns="">
+      <p:transition spd="med">
+        <p:fade/>
+      </p:transition>
+    </mc:Fallback>
+  </mc:AlternateContent>
+</p:sldLayout>
+</file>
+
+<file path=ppt/slideLayouts/slideLayout15.xml><?xml version="1.0" encoding="utf-8"?>
+<p:sldLayout xmlns:a="http://schemas.openxmlformats.org/drawingml/2006/main" xmlns:r="http://schemas.openxmlformats.org/officeDocument/2006/relationships" xmlns:p="http://schemas.openxmlformats.org/presentationml/2006/main" preserve="1" userDrawn="1">
+  <p:cSld name="Title and Content">
+    <p:spTree>
+      <p:nvGrpSpPr>
+        <p:cNvPr id="1" name=""/>
+        <p:cNvGrpSpPr/>
+        <p:nvPr/>
+      </p:nvGrpSpPr>
+      <p:grpSpPr>
+        <a:xfrm>
+          <a:off x="0" y="0"/>
+          <a:ext cx="0" cy="0"/>
+          <a:chOff x="0" y="0"/>
+          <a:chExt cx="0" cy="0"/>
+        </a:xfrm>
+      </p:grpSpPr>
+      <p:sp>
+        <p:nvSpPr>
+          <p:cNvPr id="6" name="Title 5"/>
+          <p:cNvSpPr>
+            <a:spLocks noGrp="1"/>
+          </p:cNvSpPr>
+          <p:nvPr>
+            <p:ph type="title"/>
+          </p:nvPr>
+        </p:nvSpPr>
+        <p:spPr/>
+        <p:txBody>
+          <a:bodyPr/>
+          <a:lstStyle/>
+          <a:p>
+            <a:r>
+              <a:rPr lang="en-US"/>
+              <a:t>Click to edit Master title style</a:t>
+            </a:r>
+            <a:endParaRPr lang="en-US" dirty="0"/>
+          </a:p>
+        </p:txBody>
+      </p:sp>
+      <p:sp>
+        <p:nvSpPr>
+          <p:cNvPr id="3" name="Text Placeholder 2"/>
+          <p:cNvSpPr>
+            <a:spLocks noGrp="1"/>
+          </p:cNvSpPr>
+          <p:nvPr>
+            <p:ph type="body" sz="quarter" idx="10"/>
+          </p:nvPr>
+        </p:nvSpPr>
+        <p:spPr>
+          <a:xfrm>
+            <a:off x="269303" y="1187644"/>
+            <a:ext cx="11655078" cy="2266583"/>
+          </a:xfrm>
+        </p:spPr>
+        <p:txBody>
+          <a:bodyPr/>
+          <a:lstStyle/>
+          <a:p>
+            <a:pPr lvl="0"/>
+            <a:r>
+              <a:rPr lang="en-US"/>
+              <a:t>Edit Master text styles</a:t>
+            </a:r>
+          </a:p>
+          <a:p>
+            <a:pPr lvl="1"/>
+            <a:r>
+              <a:rPr lang="en-US"/>
+              <a:t>Second level</a:t>
+            </a:r>
+          </a:p>
+          <a:p>
+            <a:pPr lvl="2"/>
+            <a:r>
+              <a:rPr lang="en-US"/>
+              <a:t>Third level</a:t>
+            </a:r>
+          </a:p>
+          <a:p>
+            <a:pPr lvl="3"/>
+            <a:r>
+              <a:rPr lang="en-US"/>
+              <a:t>Fourth level</a:t>
+            </a:r>
+          </a:p>
+          <a:p>
+            <a:pPr lvl="4"/>
+            <a:r>
+              <a:rPr lang="en-US"/>
+              <a:t>Fifth level</a:t>
+            </a:r>
+            <a:endParaRPr lang="en-US" dirty="0"/>
+          </a:p>
+        </p:txBody>
+      </p:sp>
+    </p:spTree>
+    <p:extLst>
+      <p:ext uri="{BB962C8B-B14F-4D97-AF65-F5344CB8AC3E}">
+        <p14:creationId xmlns:p14="http://schemas.microsoft.com/office/powerpoint/2010/main" val="3846119843"/>
+      </p:ext>
+    </p:extLst>
+  </p:cSld>
+  <p:clrMapOvr>
+    <a:masterClrMapping/>
+  </p:clrMapOvr>
+  <p:transition>
+    <p:fade/>
+  </p:transition>
+</p:sldLayout>
+</file>
+
+<file path=ppt/slideLayouts/slideLayout16.xml><?xml version="1.0" encoding="utf-8"?>
+<p:sldLayout xmlns:a="http://schemas.openxmlformats.org/drawingml/2006/main" xmlns:r="http://schemas.openxmlformats.org/officeDocument/2006/relationships" xmlns:p="http://schemas.openxmlformats.org/presentationml/2006/main" preserve="1" userDrawn="1">
+  <p:cSld name="Demo slide">
+    <p:bg>
+      <p:bgPr>
+        <a:solidFill>
+          <a:schemeClr val="accent1"/>
+        </a:solidFill>
+        <a:effectLst/>
+      </p:bgPr>
+    </p:bg>
+    <p:spTree>
+      <p:nvGrpSpPr>
+        <p:cNvPr id="1" name=""/>
+        <p:cNvGrpSpPr/>
+        <p:nvPr/>
+      </p:nvGrpSpPr>
+      <p:grpSpPr>
+        <a:xfrm>
+          <a:off x="0" y="0"/>
+          <a:ext cx="0" cy="0"/>
+          <a:chOff x="0" y="0"/>
+          <a:chExt cx="0" cy="0"/>
+        </a:xfrm>
+      </p:grpSpPr>
+      <p:sp>
+        <p:nvSpPr>
+          <p:cNvPr id="2" name="Title 1"/>
+          <p:cNvSpPr>
+            <a:spLocks noGrp="1"/>
+          </p:cNvSpPr>
+          <p:nvPr>
+            <p:ph type="title" hasCustomPrompt="1"/>
+          </p:nvPr>
+        </p:nvSpPr>
+        <p:spPr>
+          <a:xfrm>
+            <a:off x="269239" y="2084186"/>
+            <a:ext cx="9859116" cy="1158793"/>
+          </a:xfrm>
+          <a:noFill/>
+        </p:spPr>
+        <p:txBody>
+          <a:bodyPr tIns="91440" bIns="91440" anchor="t" anchorCtr="0">
+            <a:spAutoFit/>
+          </a:bodyPr>
+          <a:lstStyle>
+            <a:lvl1pPr>
+              <a:defRPr sz="7058" spc="-98" baseline="0">
+                <a:gradFill>
+                  <a:gsLst>
+                    <a:gs pos="0">
+                      <a:schemeClr val="tx1"/>
+                    </a:gs>
+                    <a:gs pos="100000">
+                      <a:schemeClr val="tx1"/>
+                    </a:gs>
+                  </a:gsLst>
+                  <a:lin ang="5400000" scaled="0"/>
+                </a:gradFill>
+              </a:defRPr>
+            </a:lvl1pPr>
+          </a:lstStyle>
+          <a:p>
+            <a:r>
+              <a:rPr lang="en-US" dirty="0"/>
+              <a:t>Demo title</a:t>
+            </a:r>
+          </a:p>
+        </p:txBody>
+      </p:sp>
+      <p:sp>
+        <p:nvSpPr>
+          <p:cNvPr id="5" name="Text Placeholder 4"/>
+          <p:cNvSpPr>
+            <a:spLocks noGrp="1"/>
+          </p:cNvSpPr>
+          <p:nvPr>
+            <p:ph type="body" sz="quarter" idx="12" hasCustomPrompt="1"/>
+          </p:nvPr>
+        </p:nvSpPr>
+        <p:spPr>
+          <a:xfrm>
+            <a:off x="269240" y="3877277"/>
+            <a:ext cx="9860674" cy="724246"/>
+          </a:xfrm>
+          <a:noFill/>
+        </p:spPr>
+        <p:txBody>
+          <a:bodyPr lIns="182880" tIns="146304" rIns="182880" bIns="146304">
+            <a:spAutoFit/>
+          </a:bodyPr>
+          <a:lstStyle>
+            <a:lvl1pPr marL="0" indent="0">
+              <a:spcBef>
+                <a:spcPts val="0"/>
+              </a:spcBef>
+              <a:buNone/>
+              <a:defRPr sz="3137" spc="0" baseline="0">
+                <a:gradFill>
+                  <a:gsLst>
+                    <a:gs pos="0">
+                      <a:schemeClr val="tx1"/>
+                    </a:gs>
+                    <a:gs pos="100000">
+                      <a:schemeClr val="tx1"/>
+                    </a:gs>
+                  </a:gsLst>
+                  <a:lin ang="5400000" scaled="0"/>
+                </a:gradFill>
+                <a:latin typeface="+mj-lt"/>
+              </a:defRPr>
+            </a:lvl1pPr>
+          </a:lstStyle>
+          <a:p>
+            <a:pPr lvl="0"/>
+            <a:r>
+              <a:rPr lang="en-US" dirty="0"/>
+              <a:t>Speaker Name</a:t>
+            </a:r>
+          </a:p>
+        </p:txBody>
+      </p:sp>
+    </p:spTree>
+    <p:extLst>
+      <p:ext uri="{BB962C8B-B14F-4D97-AF65-F5344CB8AC3E}">
+        <p14:creationId xmlns:p14="http://schemas.microsoft.com/office/powerpoint/2010/main" val="3414778451"/>
+      </p:ext>
+    </p:extLst>
+  </p:cSld>
+  <p:clrMapOvr>
+    <a:overrideClrMapping bg1="dk1" tx1="lt1" bg2="dk2" tx2="lt2" accent1="accent1" accent2="accent2" accent3="accent3" accent4="accent4" accent5="accent5" accent6="accent6" hlink="hlink" folHlink="folHlink"/>
+  </p:clrMapOvr>
+  <mc:AlternateContent xmlns:mc="http://schemas.openxmlformats.org/markup-compatibility/2006" xmlns:p14="http://schemas.microsoft.com/office/powerpoint/2010/main">
+    <mc:Choice Requires="p14">
+      <p:transition spd="slow" p14:dur="3400">
+        <p14:reveal/>
+      </p:transition>
+    </mc:Choice>
+    <mc:Fallback xmlns="">
+      <p:transition spd="slow">
+        <p:fade/>
+      </p:transition>
+    </mc:Fallback>
+  </mc:AlternateContent>
+</p:sldLayout>
+</file>
+
+<file path=ppt/slideLayouts/slideLayout17.xml><?xml version="1.0" encoding="utf-8"?>
+<p:sldLayout xmlns:a="http://schemas.openxmlformats.org/drawingml/2006/main" xmlns:r="http://schemas.openxmlformats.org/officeDocument/2006/relationships" xmlns:p="http://schemas.openxmlformats.org/presentationml/2006/main" preserve="1" userDrawn="1">
+  <p:cSld name="Section Title Accent Color 1">
+    <p:bg>
+      <p:bgPr>
+        <a:solidFill>
+          <a:schemeClr val="accent1"/>
+        </a:solidFill>
+        <a:effectLst/>
+      </p:bgPr>
+    </p:bg>
+    <p:spTree>
+      <p:nvGrpSpPr>
+        <p:cNvPr id="1" name=""/>
+        <p:cNvGrpSpPr/>
+        <p:nvPr/>
+      </p:nvGrpSpPr>
+      <p:grpSpPr>
+        <a:xfrm>
+          <a:off x="0" y="0"/>
+          <a:ext cx="0" cy="0"/>
+          <a:chOff x="0" y="0"/>
+          <a:chExt cx="0" cy="0"/>
+        </a:xfrm>
+      </p:grpSpPr>
+      <p:sp>
+        <p:nvSpPr>
+          <p:cNvPr id="2" name="Title 1"/>
+          <p:cNvSpPr>
+            <a:spLocks noGrp="1"/>
+          </p:cNvSpPr>
+          <p:nvPr>
+            <p:ph type="title" hasCustomPrompt="1"/>
+          </p:nvPr>
+        </p:nvSpPr>
+        <p:spPr>
+          <a:xfrm>
+            <a:off x="269239" y="2084172"/>
+            <a:ext cx="11653523" cy="1158793"/>
+          </a:xfrm>
+          <a:noFill/>
+        </p:spPr>
+        <p:txBody>
+          <a:bodyPr tIns="91440" bIns="91440" anchor="t" anchorCtr="0">
+            <a:spAutoFit/>
+          </a:bodyPr>
+          <a:lstStyle>
+            <a:lvl1pPr>
+              <a:defRPr sz="7058" spc="-98" baseline="0">
+                <a:gradFill>
+                  <a:gsLst>
+                    <a:gs pos="100000">
+                      <a:schemeClr val="tx1"/>
+                    </a:gs>
+                    <a:gs pos="0">
+                      <a:schemeClr val="tx1"/>
+                    </a:gs>
+                  </a:gsLst>
+                  <a:lin ang="5400000" scaled="0"/>
+                </a:gradFill>
+              </a:defRPr>
+            </a:lvl1pPr>
+          </a:lstStyle>
+          <a:p>
+            <a:r>
+              <a:rPr lang="en-US" dirty="0"/>
+              <a:t>Section title</a:t>
+            </a:r>
+          </a:p>
+        </p:txBody>
+      </p:sp>
+    </p:spTree>
+    <p:extLst>
+      <p:ext uri="{BB962C8B-B14F-4D97-AF65-F5344CB8AC3E}">
+        <p14:creationId xmlns:p14="http://schemas.microsoft.com/office/powerpoint/2010/main" val="1514810496"/>
+      </p:ext>
+    </p:extLst>
+  </p:cSld>
+  <p:clrMapOvr>
+    <a:overrideClrMapping bg1="dk1" tx1="lt1" bg2="dk2" tx2="lt2" accent1="accent1" accent2="accent2" accent3="accent3" accent4="accent4" accent5="accent5" accent6="accent6" hlink="hlink" folHlink="folHlink"/>
+  </p:clrMapOvr>
+  <p:transition>
+    <p:fade/>
+  </p:transition>
+</p:sldLayout>
+</file>
+
+<file path=ppt/slideLayouts/slideLayout18.xml><?xml version="1.0" encoding="utf-8"?>
+<p:sldLayout xmlns:a="http://schemas.openxmlformats.org/drawingml/2006/main" xmlns:r="http://schemas.openxmlformats.org/officeDocument/2006/relationships" xmlns:p="http://schemas.openxmlformats.org/presentationml/2006/main" preserve="1" userDrawn="1">
+  <p:cSld name="Developer Code Layout">
+    <p:spTree>
+      <p:nvGrpSpPr>
+        <p:cNvPr id="1" name=""/>
+        <p:cNvGrpSpPr/>
+        <p:nvPr/>
+      </p:nvGrpSpPr>
+      <p:grpSpPr>
+        <a:xfrm>
+          <a:off x="0" y="0"/>
+          <a:ext cx="0" cy="0"/>
+          <a:chOff x="0" y="0"/>
+          <a:chExt cx="0" cy="0"/>
+        </a:xfrm>
+      </p:grpSpPr>
+      <p:sp>
+        <p:nvSpPr>
+          <p:cNvPr id="2" name="Title 1"/>
+          <p:cNvSpPr>
+            <a:spLocks noGrp="1"/>
+          </p:cNvSpPr>
+          <p:nvPr>
+            <p:ph type="title" hasCustomPrompt="1"/>
+          </p:nvPr>
+        </p:nvSpPr>
+        <p:spPr/>
+        <p:txBody>
+          <a:bodyPr/>
+          <a:lstStyle>
+            <a:lvl1pPr>
+              <a:defRPr baseline="0"/>
+            </a:lvl1pPr>
+          </a:lstStyle>
+          <a:p>
+            <a:r>
+              <a:rPr lang="en-US" dirty="0"/>
+              <a:t>Slide for developer code</a:t>
+            </a:r>
+          </a:p>
+        </p:txBody>
+      </p:sp>
+      <p:sp>
+        <p:nvSpPr>
+          <p:cNvPr id="3" name="Rectangle 2"/>
+          <p:cNvSpPr/>
+          <p:nvPr userDrawn="1"/>
+        </p:nvSpPr>
+        <p:spPr bwMode="hidden">
+          <a:xfrm>
+            <a:off x="1" y="1189176"/>
+            <a:ext cx="12192000" cy="5668824"/>
+          </a:xfrm>
+          <a:prstGeom prst="rect">
+            <a:avLst/>
+          </a:prstGeom>
+          <a:solidFill>
+            <a:srgbClr val="FFFFFF"/>
+          </a:solidFill>
+          <a:ln>
+            <a:noFill/>
+            <a:headEnd type="none" w="med" len="med"/>
+            <a:tailEnd type="none" w="med" len="med"/>
+          </a:ln>
+          <a:effectLst/>
+        </p:spPr>
+        <p:style>
+          <a:lnRef idx="1">
+            <a:schemeClr val="accent2"/>
+          </a:lnRef>
+          <a:fillRef idx="3">
+            <a:schemeClr val="accent2"/>
+          </a:fillRef>
+          <a:effectRef idx="2">
+            <a:schemeClr val="accent2"/>
+          </a:effectRef>
+          <a:fontRef idx="minor">
+            <a:schemeClr val="lt1"/>
+          </a:fontRef>
+        </p:style>
+        <p:txBody>
+          <a:bodyPr rot="0" spcFirstLastPara="0" vertOverflow="overflow" horzOverflow="overflow" vert="horz" wrap="square" lIns="45722" tIns="45722" rIns="45722" bIns="45722" numCol="1" spcCol="0" rtlCol="0" fromWordArt="0" anchor="ctr" anchorCtr="0" forceAA="0" compatLnSpc="1">
+            <a:prstTxWarp prst="textNoShape">
+              <a:avLst/>
+            </a:prstTxWarp>
+            <a:noAutofit/>
+          </a:bodyPr>
+          <a:lstStyle/>
+          <a:p>
+            <a:pPr algn="ctr" defTabSz="914102" fontAlgn="base">
+              <a:spcBef>
+                <a:spcPct val="0"/>
+              </a:spcBef>
+              <a:spcAft>
+                <a:spcPct val="0"/>
+              </a:spcAft>
+            </a:pPr>
+            <a:endParaRPr lang="en-US" sz="1765" dirty="0">
+              <a:gradFill>
+                <a:gsLst>
+                  <a:gs pos="0">
+                    <a:srgbClr val="FFFFFF"/>
+                  </a:gs>
+                  <a:gs pos="100000">
+                    <a:srgbClr val="FFFFFF"/>
+                  </a:gs>
+                </a:gsLst>
+                <a:lin ang="5400000" scaled="0"/>
+              </a:gradFill>
+              <a:ea typeface="Segoe UI" pitchFamily="34" charset="0"/>
+              <a:cs typeface="Segoe UI" pitchFamily="34" charset="0"/>
+            </a:endParaRPr>
+          </a:p>
+        </p:txBody>
+      </p:sp>
+      <p:sp>
+        <p:nvSpPr>
+          <p:cNvPr id="5" name="Text Placeholder 4"/>
+          <p:cNvSpPr>
+            <a:spLocks noGrp="1"/>
+          </p:cNvSpPr>
+          <p:nvPr>
+            <p:ph type="body" sz="quarter" idx="10"/>
+          </p:nvPr>
+        </p:nvSpPr>
+        <p:spPr>
+          <a:xfrm>
+            <a:off x="269239" y="1197322"/>
+            <a:ext cx="11653522" cy="2225866"/>
+          </a:xfrm>
+        </p:spPr>
+        <p:txBody>
+          <a:bodyPr/>
+          <a:lstStyle>
+            <a:lvl1pPr marL="0" indent="0">
+              <a:buNone/>
+              <a:defRPr sz="3235">
+                <a:gradFill>
+                  <a:gsLst>
+                    <a:gs pos="8718">
+                      <a:srgbClr val="353535"/>
+                    </a:gs>
+                    <a:gs pos="34000">
+                      <a:srgbClr val="353535"/>
+                    </a:gs>
+                  </a:gsLst>
+                  <a:lin ang="5400000" scaled="0"/>
+                </a:gradFill>
+                <a:latin typeface="Consolas" panose="020B0609020204030204" pitchFamily="49" charset="0"/>
+                <a:cs typeface="Consolas" panose="020B0609020204030204" pitchFamily="49" charset="0"/>
+              </a:defRPr>
+            </a:lvl1pPr>
+            <a:lvl2pPr marL="339726" indent="0">
+              <a:buNone/>
+              <a:defRPr>
+                <a:gradFill>
+                  <a:gsLst>
+                    <a:gs pos="8718">
+                      <a:srgbClr val="353535"/>
+                    </a:gs>
+                    <a:gs pos="34000">
+                      <a:srgbClr val="353535"/>
+                    </a:gs>
+                  </a:gsLst>
+                  <a:lin ang="5400000" scaled="0"/>
+                </a:gradFill>
+                <a:latin typeface="Consolas" panose="020B0609020204030204" pitchFamily="49" charset="0"/>
+                <a:cs typeface="Consolas" panose="020B0609020204030204" pitchFamily="49" charset="0"/>
+              </a:defRPr>
+            </a:lvl2pPr>
+            <a:lvl3pPr marL="573090" indent="0">
+              <a:buNone/>
+              <a:defRPr>
+                <a:gradFill>
+                  <a:gsLst>
+                    <a:gs pos="8718">
+                      <a:srgbClr val="353535"/>
+                    </a:gs>
+                    <a:gs pos="34000">
+                      <a:srgbClr val="353535"/>
+                    </a:gs>
+                  </a:gsLst>
+                  <a:lin ang="5400000" scaled="0"/>
+                </a:gradFill>
+                <a:latin typeface="Consolas" panose="020B0609020204030204" pitchFamily="49" charset="0"/>
+                <a:cs typeface="Consolas" panose="020B0609020204030204" pitchFamily="49" charset="0"/>
+              </a:defRPr>
+            </a:lvl3pPr>
+            <a:lvl4pPr marL="798516" indent="0">
+              <a:buNone/>
+              <a:defRPr>
+                <a:gradFill>
+                  <a:gsLst>
+                    <a:gs pos="8718">
+                      <a:srgbClr val="353535"/>
+                    </a:gs>
+                    <a:gs pos="34000">
+                      <a:srgbClr val="353535"/>
+                    </a:gs>
+                  </a:gsLst>
+                  <a:lin ang="5400000" scaled="0"/>
+                </a:gradFill>
+                <a:latin typeface="Consolas" panose="020B0609020204030204" pitchFamily="49" charset="0"/>
+                <a:cs typeface="Consolas" panose="020B0609020204030204" pitchFamily="49" charset="0"/>
+              </a:defRPr>
+            </a:lvl4pPr>
+            <a:lvl5pPr marL="1030292" indent="0">
+              <a:buNone/>
+              <a:defRPr>
+                <a:gradFill>
+                  <a:gsLst>
+                    <a:gs pos="8718">
+                      <a:srgbClr val="353535"/>
+                    </a:gs>
+                    <a:gs pos="34000">
+                      <a:srgbClr val="353535"/>
+                    </a:gs>
+                  </a:gsLst>
+                  <a:lin ang="5400000" scaled="0"/>
+                </a:gradFill>
+                <a:latin typeface="Consolas" panose="020B0609020204030204" pitchFamily="49" charset="0"/>
+                <a:cs typeface="Consolas" panose="020B0609020204030204" pitchFamily="49" charset="0"/>
+              </a:defRPr>
+            </a:lvl5pPr>
+          </a:lstStyle>
+          <a:p>
+            <a:pPr lvl="0"/>
+            <a:r>
+              <a:rPr lang="en-US"/>
+              <a:t>Edit Master text styles</a:t>
+            </a:r>
+          </a:p>
+          <a:p>
+            <a:pPr lvl="1"/>
+            <a:r>
+              <a:rPr lang="en-US"/>
+              <a:t>Second level</a:t>
+            </a:r>
+          </a:p>
+          <a:p>
+            <a:pPr lvl="2"/>
+            <a:r>
+              <a:rPr lang="en-US"/>
+              <a:t>Third level</a:t>
+            </a:r>
+          </a:p>
+          <a:p>
+            <a:pPr lvl="3"/>
+            <a:r>
+              <a:rPr lang="en-US"/>
+              <a:t>Fourth level</a:t>
+            </a:r>
+          </a:p>
+          <a:p>
+            <a:pPr lvl="4"/>
+            <a:r>
+              <a:rPr lang="en-US"/>
+              <a:t>Fifth level</a:t>
+            </a:r>
+            <a:endParaRPr lang="en-US" dirty="0"/>
+          </a:p>
+        </p:txBody>
+      </p:sp>
+    </p:spTree>
+    <p:extLst>
+      <p:ext uri="{BB962C8B-B14F-4D97-AF65-F5344CB8AC3E}">
+        <p14:creationId xmlns:p14="http://schemas.microsoft.com/office/powerpoint/2010/main" val="2330788988"/>
+      </p:ext>
+    </p:extLst>
+  </p:cSld>
+  <p:clrMapOvr>
+    <a:masterClrMapping/>
+  </p:clrMapOvr>
+  <p:transition>
+    <p:fade/>
+  </p:transition>
+</p:sldLayout>
+</file>
+
 <file path=ppt/slideLayouts/slideLayout2.xml><?xml version="1.0" encoding="utf-8"?>
 <p:sldLayout xmlns:a="http://schemas.openxmlformats.org/drawingml/2006/main" xmlns:r="http://schemas.openxmlformats.org/officeDocument/2006/relationships" xmlns:p="http://schemas.openxmlformats.org/presentationml/2006/main" type="obj" preserve="1">
   <p:cSld name="Title and Content">
@@ -6275,7 +7468,7 @@
           <a:p>
             <a:fld id="{AFAAA849-1D6E-40B2-B057-39C83678EF33}" type="datetimeFigureOut">
               <a:rPr lang="en-US" smtClean="0"/>
-              <a:t>8/22/2017</a:t>
+              <a:t>9/17/2017</a:t>
             </a:fld>
             <a:endParaRPr lang="en-US"/>
           </a:p>
@@ -6550,7 +7743,7 @@
           <a:p>
             <a:fld id="{AFAAA849-1D6E-40B2-B057-39C83678EF33}" type="datetimeFigureOut">
               <a:rPr lang="en-US" smtClean="0"/>
-              <a:t>8/22/2017</a:t>
+              <a:t>9/17/2017</a:t>
             </a:fld>
             <a:endParaRPr lang="en-US"/>
           </a:p>
@@ -6815,7 +8008,7 @@
           <a:p>
             <a:fld id="{AFAAA849-1D6E-40B2-B057-39C83678EF33}" type="datetimeFigureOut">
               <a:rPr lang="en-US" smtClean="0"/>
-              <a:t>8/22/2017</a:t>
+              <a:t>9/17/2017</a:t>
             </a:fld>
             <a:endParaRPr lang="en-US"/>
           </a:p>
@@ -7227,7 +8420,7 @@
           <a:p>
             <a:fld id="{AFAAA849-1D6E-40B2-B057-39C83678EF33}" type="datetimeFigureOut">
               <a:rPr lang="en-US" smtClean="0"/>
-              <a:t>8/22/2017</a:t>
+              <a:t>9/17/2017</a:t>
             </a:fld>
             <a:endParaRPr lang="en-US"/>
           </a:p>
@@ -7368,7 +8561,7 @@
           <a:p>
             <a:fld id="{AFAAA849-1D6E-40B2-B057-39C83678EF33}" type="datetimeFigureOut">
               <a:rPr lang="en-US" smtClean="0"/>
-              <a:t>8/22/2017</a:t>
+              <a:t>9/17/2017</a:t>
             </a:fld>
             <a:endParaRPr lang="en-US"/>
           </a:p>
@@ -7481,7 +8674,7 @@
           <a:p>
             <a:fld id="{AFAAA849-1D6E-40B2-B057-39C83678EF33}" type="datetimeFigureOut">
               <a:rPr lang="en-US" smtClean="0"/>
-              <a:t>8/22/2017</a:t>
+              <a:t>9/17/2017</a:t>
             </a:fld>
             <a:endParaRPr lang="en-US"/>
           </a:p>
@@ -7792,7 +8985,7 @@
           <a:p>
             <a:fld id="{AFAAA849-1D6E-40B2-B057-39C83678EF33}" type="datetimeFigureOut">
               <a:rPr lang="en-US" smtClean="0"/>
-              <a:t>8/22/2017</a:t>
+              <a:t>9/17/2017</a:t>
             </a:fld>
             <a:endParaRPr lang="en-US"/>
           </a:p>
@@ -8080,7 +9273,7 @@
           <a:p>
             <a:fld id="{AFAAA849-1D6E-40B2-B057-39C83678EF33}" type="datetimeFigureOut">
               <a:rPr lang="en-US" smtClean="0"/>
-              <a:t>8/22/2017</a:t>
+              <a:t>9/17/2017</a:t>
             </a:fld>
             <a:endParaRPr lang="en-US"/>
           </a:p>
@@ -8321,7 +9514,7 @@
           <a:p>
             <a:fld id="{AFAAA849-1D6E-40B2-B057-39C83678EF33}" type="datetimeFigureOut">
               <a:rPr lang="en-US" smtClean="0"/>
-              <a:t>8/22/2017</a:t>
+              <a:t>9/17/2017</a:t>
             </a:fld>
             <a:endParaRPr lang="en-US"/>
           </a:p>
@@ -8723,6 +9916,660 @@
 </p:sldMaster>
 </file>
 
+<file path=ppt/slideMasters/slideMaster2.xml><?xml version="1.0" encoding="utf-8"?>
+<p:sldMaster xmlns:a="http://schemas.openxmlformats.org/drawingml/2006/main" xmlns:r="http://schemas.openxmlformats.org/officeDocument/2006/relationships" xmlns:p="http://schemas.openxmlformats.org/presentationml/2006/main" preserve="1">
+  <p:cSld>
+    <p:bg>
+      <p:bgRef idx="1001">
+        <a:schemeClr val="bg1"/>
+      </p:bgRef>
+    </p:bg>
+    <p:spTree>
+      <p:nvGrpSpPr>
+        <p:cNvPr id="1" name=""/>
+        <p:cNvGrpSpPr/>
+        <p:nvPr/>
+      </p:nvGrpSpPr>
+      <p:grpSpPr>
+        <a:xfrm>
+          <a:off x="0" y="0"/>
+          <a:ext cx="0" cy="0"/>
+          <a:chOff x="0" y="0"/>
+          <a:chExt cx="0" cy="0"/>
+        </a:xfrm>
+      </p:grpSpPr>
+      <p:sp>
+        <p:nvSpPr>
+          <p:cNvPr id="2" name="Title Placeholder 1"/>
+          <p:cNvSpPr>
+            <a:spLocks noGrp="1"/>
+          </p:cNvSpPr>
+          <p:nvPr>
+            <p:ph type="title"/>
+          </p:nvPr>
+        </p:nvSpPr>
+        <p:spPr>
+          <a:xfrm>
+            <a:off x="269240" y="289511"/>
+            <a:ext cx="11655840" cy="899665"/>
+          </a:xfrm>
+          <a:prstGeom prst="rect">
+            <a:avLst/>
+          </a:prstGeom>
+        </p:spPr>
+        <p:txBody>
+          <a:bodyPr vert="horz" wrap="square" lIns="146304" tIns="91440" rIns="146304" bIns="91440" rtlCol="0" anchor="t">
+            <a:noAutofit/>
+          </a:bodyPr>
+          <a:lstStyle/>
+          <a:p>
+            <a:r>
+              <a:rPr lang="en-US"/>
+              <a:t>Click to edit Master title style</a:t>
+            </a:r>
+            <a:endParaRPr lang="en-US" dirty="0"/>
+          </a:p>
+        </p:txBody>
+      </p:sp>
+      <p:sp>
+        <p:nvSpPr>
+          <p:cNvPr id="4" name="Text Placeholder 3"/>
+          <p:cNvSpPr>
+            <a:spLocks noGrp="1"/>
+          </p:cNvSpPr>
+          <p:nvPr>
+            <p:ph type="body" idx="1"/>
+          </p:nvPr>
+        </p:nvSpPr>
+        <p:spPr>
+          <a:xfrm>
+            <a:off x="269241" y="1189178"/>
+            <a:ext cx="11653521" cy="2263268"/>
+          </a:xfrm>
+          <a:prstGeom prst="rect">
+            <a:avLst/>
+          </a:prstGeom>
+        </p:spPr>
+        <p:txBody>
+          <a:bodyPr vert="horz" wrap="square" lIns="146304" tIns="91440" rIns="146304" bIns="91440" rtlCol="0">
+            <a:spAutoFit/>
+          </a:bodyPr>
+          <a:lstStyle/>
+          <a:p>
+            <a:pPr lvl="0"/>
+            <a:r>
+              <a:rPr lang="en-US"/>
+              <a:t>Edit Master text styles</a:t>
+            </a:r>
+          </a:p>
+          <a:p>
+            <a:pPr lvl="1"/>
+            <a:r>
+              <a:rPr lang="en-US"/>
+              <a:t>Second level</a:t>
+            </a:r>
+          </a:p>
+          <a:p>
+            <a:pPr lvl="2"/>
+            <a:r>
+              <a:rPr lang="en-US"/>
+              <a:t>Third level</a:t>
+            </a:r>
+          </a:p>
+          <a:p>
+            <a:pPr lvl="3"/>
+            <a:r>
+              <a:rPr lang="en-US"/>
+              <a:t>Fourth level</a:t>
+            </a:r>
+          </a:p>
+          <a:p>
+            <a:pPr lvl="4"/>
+            <a:r>
+              <a:rPr lang="en-US"/>
+              <a:t>Fifth level</a:t>
+            </a:r>
+            <a:endParaRPr lang="en-US" dirty="0"/>
+          </a:p>
+        </p:txBody>
+      </p:sp>
+      <p:pic>
+        <p:nvPicPr>
+          <p:cNvPr id="5" name="Picture 4"/>
+          <p:cNvPicPr>
+            <a:picLocks noChangeAspect="1"/>
+          </p:cNvPicPr>
+          <p:nvPr/>
+        </p:nvPicPr>
+        <p:blipFill>
+          <a:blip r:embed="rId7" cstate="screen">
+            <a:extLst>
+              <a:ext uri="{28A0092B-C50C-407E-A947-70E740481C1C}">
+                <a14:useLocalDpi xmlns:a14="http://schemas.microsoft.com/office/drawing/2010/main"/>
+              </a:ext>
+            </a:extLst>
+          </a:blip>
+          <a:stretch>
+            <a:fillRect/>
+          </a:stretch>
+        </p:blipFill>
+        <p:spPr>
+          <a:xfrm rot="5400000">
+            <a:off x="9187079" y="3012391"/>
+            <a:ext cx="6858623" cy="833218"/>
+          </a:xfrm>
+          <a:prstGeom prst="rect">
+            <a:avLst/>
+          </a:prstGeom>
+        </p:spPr>
+      </p:pic>
+    </p:spTree>
+    <p:extLst>
+      <p:ext uri="{BB962C8B-B14F-4D97-AF65-F5344CB8AC3E}">
+        <p14:creationId xmlns:p14="http://schemas.microsoft.com/office/powerpoint/2010/main" val="2188958870"/>
+      </p:ext>
+    </p:extLst>
+  </p:cSld>
+  <p:clrMap bg1="dk1" tx1="lt1" bg2="dk2" tx2="lt2" accent1="accent1" accent2="accent2" accent3="accent3" accent4="accent4" accent5="accent5" accent6="accent6" hlink="hlink" folHlink="folHlink"/>
+  <p:sldLayoutIdLst>
+    <p:sldLayoutId id="2147483663" r:id="rId1"/>
+    <p:sldLayoutId id="2147483664" r:id="rId2"/>
+    <p:sldLayoutId id="2147483665" r:id="rId3"/>
+    <p:sldLayoutId id="2147483666" r:id="rId4"/>
+    <p:sldLayoutId id="2147483667" r:id="rId5"/>
+  </p:sldLayoutIdLst>
+  <p:transition>
+    <p:fade/>
+  </p:transition>
+  <p:txStyles>
+    <p:titleStyle>
+      <a:lvl1pPr algn="l" defTabSz="914367" rtl="0" eaLnBrk="1" latinLnBrk="0" hangingPunct="1">
+        <a:lnSpc>
+          <a:spcPct val="90000"/>
+        </a:lnSpc>
+        <a:spcBef>
+          <a:spcPct val="0"/>
+        </a:spcBef>
+        <a:buNone/>
+        <a:defRPr lang="en-US" sz="4705" b="0" kern="1200" cap="none" spc="-100" baseline="0" dirty="0" smtClean="0">
+          <a:ln w="3175">
+            <a:noFill/>
+          </a:ln>
+          <a:gradFill>
+            <a:gsLst>
+              <a:gs pos="1250">
+                <a:schemeClr val="tx1"/>
+              </a:gs>
+              <a:gs pos="100000">
+                <a:schemeClr val="tx1"/>
+              </a:gs>
+            </a:gsLst>
+            <a:lin ang="5400000" scaled="0"/>
+          </a:gradFill>
+          <a:effectLst/>
+          <a:latin typeface="+mj-lt"/>
+          <a:ea typeface="+mn-ea"/>
+          <a:cs typeface="Segoe UI" pitchFamily="34" charset="0"/>
+        </a:defRPr>
+      </a:lvl1pPr>
+    </p:titleStyle>
+    <p:bodyStyle>
+      <a:lvl1pPr marL="224097" marR="0" indent="-224097" algn="l" defTabSz="914367" rtl="0" eaLnBrk="1" fontAlgn="auto" latinLnBrk="0" hangingPunct="1">
+        <a:lnSpc>
+          <a:spcPct val="90000"/>
+        </a:lnSpc>
+        <a:spcBef>
+          <a:spcPct val="20000"/>
+        </a:spcBef>
+        <a:spcAft>
+          <a:spcPts val="0"/>
+        </a:spcAft>
+        <a:buClrTx/>
+        <a:buSzPct val="90000"/>
+        <a:buFont typeface="Wingdings" panose="05000000000000000000" pitchFamily="2" charset="2"/>
+        <a:buChar char=""/>
+        <a:tabLst/>
+        <a:defRPr sz="3529" kern="1200" spc="0" baseline="0">
+          <a:gradFill>
+            <a:gsLst>
+              <a:gs pos="1250">
+                <a:schemeClr val="tx1"/>
+              </a:gs>
+              <a:gs pos="100000">
+                <a:schemeClr val="tx1"/>
+              </a:gs>
+            </a:gsLst>
+            <a:lin ang="5400000" scaled="0"/>
+          </a:gradFill>
+          <a:latin typeface="+mj-lt"/>
+          <a:ea typeface="+mn-ea"/>
+          <a:cs typeface="+mn-cs"/>
+        </a:defRPr>
+      </a:lvl1pPr>
+      <a:lvl2pPr marL="448193" marR="0" indent="-224097" algn="l" defTabSz="914367" rtl="0" eaLnBrk="1" fontAlgn="auto" latinLnBrk="0" hangingPunct="1">
+        <a:lnSpc>
+          <a:spcPct val="90000"/>
+        </a:lnSpc>
+        <a:spcBef>
+          <a:spcPct val="20000"/>
+        </a:spcBef>
+        <a:spcAft>
+          <a:spcPts val="0"/>
+        </a:spcAft>
+        <a:buClrTx/>
+        <a:buSzPct val="90000"/>
+        <a:buFont typeface="Wingdings" panose="05000000000000000000" pitchFamily="2" charset="2"/>
+        <a:buChar char=""/>
+        <a:tabLst/>
+        <a:defRPr sz="2745" kern="1200" spc="0" baseline="0">
+          <a:gradFill>
+            <a:gsLst>
+              <a:gs pos="1250">
+                <a:schemeClr val="tx1"/>
+              </a:gs>
+              <a:gs pos="100000">
+                <a:schemeClr val="tx1"/>
+              </a:gs>
+            </a:gsLst>
+            <a:lin ang="5400000" scaled="0"/>
+          </a:gradFill>
+          <a:latin typeface="+mn-lt"/>
+          <a:ea typeface="+mn-ea"/>
+          <a:cs typeface="+mn-cs"/>
+        </a:defRPr>
+      </a:lvl2pPr>
+      <a:lvl3pPr marL="672290" marR="0" indent="-224097" algn="l" defTabSz="914367" rtl="0" eaLnBrk="1" fontAlgn="auto" latinLnBrk="0" hangingPunct="1">
+        <a:lnSpc>
+          <a:spcPct val="90000"/>
+        </a:lnSpc>
+        <a:spcBef>
+          <a:spcPct val="20000"/>
+        </a:spcBef>
+        <a:spcAft>
+          <a:spcPts val="0"/>
+        </a:spcAft>
+        <a:buClrTx/>
+        <a:buSzPct val="90000"/>
+        <a:buFont typeface="Wingdings" panose="05000000000000000000" pitchFamily="2" charset="2"/>
+        <a:buChar char=""/>
+        <a:tabLst/>
+        <a:defRPr sz="2353" kern="1200" spc="0" baseline="0">
+          <a:gradFill>
+            <a:gsLst>
+              <a:gs pos="1250">
+                <a:schemeClr val="tx1"/>
+              </a:gs>
+              <a:gs pos="100000">
+                <a:schemeClr val="tx1"/>
+              </a:gs>
+            </a:gsLst>
+            <a:lin ang="5400000" scaled="0"/>
+          </a:gradFill>
+          <a:latin typeface="+mn-lt"/>
+          <a:ea typeface="+mn-ea"/>
+          <a:cs typeface="+mn-cs"/>
+        </a:defRPr>
+      </a:lvl3pPr>
+      <a:lvl4pPr marL="896386" marR="0" indent="-224097" algn="l" defTabSz="914367" rtl="0" eaLnBrk="1" fontAlgn="auto" latinLnBrk="0" hangingPunct="1">
+        <a:lnSpc>
+          <a:spcPct val="90000"/>
+        </a:lnSpc>
+        <a:spcBef>
+          <a:spcPct val="20000"/>
+        </a:spcBef>
+        <a:spcAft>
+          <a:spcPts val="0"/>
+        </a:spcAft>
+        <a:buClrTx/>
+        <a:buSzPct val="90000"/>
+        <a:buFont typeface="Wingdings" panose="05000000000000000000" pitchFamily="2" charset="2"/>
+        <a:buChar char=""/>
+        <a:tabLst/>
+        <a:defRPr sz="2157" kern="1200" spc="0" baseline="0">
+          <a:gradFill>
+            <a:gsLst>
+              <a:gs pos="1250">
+                <a:schemeClr val="tx1"/>
+              </a:gs>
+              <a:gs pos="100000">
+                <a:schemeClr val="tx1"/>
+              </a:gs>
+            </a:gsLst>
+            <a:lin ang="5400000" scaled="0"/>
+          </a:gradFill>
+          <a:latin typeface="+mn-lt"/>
+          <a:ea typeface="+mn-ea"/>
+          <a:cs typeface="+mn-cs"/>
+        </a:defRPr>
+      </a:lvl4pPr>
+      <a:lvl5pPr marL="1120483" marR="0" indent="-224097" algn="l" defTabSz="914367" rtl="0" eaLnBrk="1" fontAlgn="auto" latinLnBrk="0" hangingPunct="1">
+        <a:lnSpc>
+          <a:spcPct val="90000"/>
+        </a:lnSpc>
+        <a:spcBef>
+          <a:spcPct val="20000"/>
+        </a:spcBef>
+        <a:spcAft>
+          <a:spcPts val="0"/>
+        </a:spcAft>
+        <a:buClrTx/>
+        <a:buSzPct val="90000"/>
+        <a:buFont typeface="Wingdings" panose="05000000000000000000" pitchFamily="2" charset="2"/>
+        <a:buChar char=""/>
+        <a:tabLst/>
+        <a:defRPr sz="2157" kern="1200" spc="0" baseline="0">
+          <a:gradFill>
+            <a:gsLst>
+              <a:gs pos="1250">
+                <a:schemeClr val="tx1"/>
+              </a:gs>
+              <a:gs pos="100000">
+                <a:schemeClr val="tx1"/>
+              </a:gs>
+            </a:gsLst>
+            <a:lin ang="5400000" scaled="0"/>
+          </a:gradFill>
+          <a:latin typeface="+mn-lt"/>
+          <a:ea typeface="+mn-ea"/>
+          <a:cs typeface="+mn-cs"/>
+        </a:defRPr>
+      </a:lvl5pPr>
+      <a:lvl6pPr marL="2514509" indent="-228592" algn="l" defTabSz="914367" rtl="0" eaLnBrk="1" latinLnBrk="0" hangingPunct="1">
+        <a:spcBef>
+          <a:spcPct val="20000"/>
+        </a:spcBef>
+        <a:buFont typeface="Arial" pitchFamily="34" charset="0"/>
+        <a:buChar char="•"/>
+        <a:defRPr sz="1961" kern="1200">
+          <a:solidFill>
+            <a:schemeClr val="tx1"/>
+          </a:solidFill>
+          <a:latin typeface="+mn-lt"/>
+          <a:ea typeface="+mn-ea"/>
+          <a:cs typeface="+mn-cs"/>
+        </a:defRPr>
+      </a:lvl6pPr>
+      <a:lvl7pPr marL="2971693" indent="-228592" algn="l" defTabSz="914367" rtl="0" eaLnBrk="1" latinLnBrk="0" hangingPunct="1">
+        <a:spcBef>
+          <a:spcPct val="20000"/>
+        </a:spcBef>
+        <a:buFont typeface="Arial" pitchFamily="34" charset="0"/>
+        <a:buChar char="•"/>
+        <a:defRPr sz="1961" kern="1200">
+          <a:solidFill>
+            <a:schemeClr val="tx1"/>
+          </a:solidFill>
+          <a:latin typeface="+mn-lt"/>
+          <a:ea typeface="+mn-ea"/>
+          <a:cs typeface="+mn-cs"/>
+        </a:defRPr>
+      </a:lvl7pPr>
+      <a:lvl8pPr marL="3428877" indent="-228592" algn="l" defTabSz="914367" rtl="0" eaLnBrk="1" latinLnBrk="0" hangingPunct="1">
+        <a:spcBef>
+          <a:spcPct val="20000"/>
+        </a:spcBef>
+        <a:buFont typeface="Arial" pitchFamily="34" charset="0"/>
+        <a:buChar char="•"/>
+        <a:defRPr sz="1961" kern="1200">
+          <a:solidFill>
+            <a:schemeClr val="tx1"/>
+          </a:solidFill>
+          <a:latin typeface="+mn-lt"/>
+          <a:ea typeface="+mn-ea"/>
+          <a:cs typeface="+mn-cs"/>
+        </a:defRPr>
+      </a:lvl8pPr>
+      <a:lvl9pPr marL="3886061" indent="-228592" algn="l" defTabSz="914367" rtl="0" eaLnBrk="1" latinLnBrk="0" hangingPunct="1">
+        <a:spcBef>
+          <a:spcPct val="20000"/>
+        </a:spcBef>
+        <a:buFont typeface="Arial" pitchFamily="34" charset="0"/>
+        <a:buChar char="•"/>
+        <a:defRPr sz="1961" kern="1200">
+          <a:solidFill>
+            <a:schemeClr val="tx1"/>
+          </a:solidFill>
+          <a:latin typeface="+mn-lt"/>
+          <a:ea typeface="+mn-ea"/>
+          <a:cs typeface="+mn-cs"/>
+        </a:defRPr>
+      </a:lvl9pPr>
+    </p:bodyStyle>
+    <p:otherStyle>
+      <a:defPPr>
+        <a:defRPr lang="en-US"/>
+      </a:defPPr>
+      <a:lvl1pPr marL="0" algn="l" defTabSz="914367" rtl="0" eaLnBrk="1" latinLnBrk="0" hangingPunct="1">
+        <a:defRPr sz="1765" kern="1200">
+          <a:solidFill>
+            <a:schemeClr val="tx1"/>
+          </a:solidFill>
+          <a:latin typeface="+mn-lt"/>
+          <a:ea typeface="+mn-ea"/>
+          <a:cs typeface="+mn-cs"/>
+        </a:defRPr>
+      </a:lvl1pPr>
+      <a:lvl2pPr marL="457183" algn="l" defTabSz="914367" rtl="0" eaLnBrk="1" latinLnBrk="0" hangingPunct="1">
+        <a:defRPr sz="1765" kern="1200">
+          <a:solidFill>
+            <a:schemeClr val="tx1"/>
+          </a:solidFill>
+          <a:latin typeface="+mn-lt"/>
+          <a:ea typeface="+mn-ea"/>
+          <a:cs typeface="+mn-cs"/>
+        </a:defRPr>
+      </a:lvl2pPr>
+      <a:lvl3pPr marL="914367" algn="l" defTabSz="914367" rtl="0" eaLnBrk="1" latinLnBrk="0" hangingPunct="1">
+        <a:defRPr sz="1765" kern="1200">
+          <a:solidFill>
+            <a:schemeClr val="tx1"/>
+          </a:solidFill>
+          <a:latin typeface="+mn-lt"/>
+          <a:ea typeface="+mn-ea"/>
+          <a:cs typeface="+mn-cs"/>
+        </a:defRPr>
+      </a:lvl3pPr>
+      <a:lvl4pPr marL="1371550" algn="l" defTabSz="914367" rtl="0" eaLnBrk="1" latinLnBrk="0" hangingPunct="1">
+        <a:defRPr sz="1765" kern="1200">
+          <a:solidFill>
+            <a:schemeClr val="tx1"/>
+          </a:solidFill>
+          <a:latin typeface="+mn-lt"/>
+          <a:ea typeface="+mn-ea"/>
+          <a:cs typeface="+mn-cs"/>
+        </a:defRPr>
+      </a:lvl4pPr>
+      <a:lvl5pPr marL="1828734" algn="l" defTabSz="914367" rtl="0" eaLnBrk="1" latinLnBrk="0" hangingPunct="1">
+        <a:defRPr sz="1765" kern="1200">
+          <a:solidFill>
+            <a:schemeClr val="tx1"/>
+          </a:solidFill>
+          <a:latin typeface="+mn-lt"/>
+          <a:ea typeface="+mn-ea"/>
+          <a:cs typeface="+mn-cs"/>
+        </a:defRPr>
+      </a:lvl5pPr>
+      <a:lvl6pPr marL="2285918" algn="l" defTabSz="914367" rtl="0" eaLnBrk="1" latinLnBrk="0" hangingPunct="1">
+        <a:defRPr sz="1765" kern="1200">
+          <a:solidFill>
+            <a:schemeClr val="tx1"/>
+          </a:solidFill>
+          <a:latin typeface="+mn-lt"/>
+          <a:ea typeface="+mn-ea"/>
+          <a:cs typeface="+mn-cs"/>
+        </a:defRPr>
+      </a:lvl6pPr>
+      <a:lvl7pPr marL="2743101" algn="l" defTabSz="914367" rtl="0" eaLnBrk="1" latinLnBrk="0" hangingPunct="1">
+        <a:defRPr sz="1765" kern="1200">
+          <a:solidFill>
+            <a:schemeClr val="tx1"/>
+          </a:solidFill>
+          <a:latin typeface="+mn-lt"/>
+          <a:ea typeface="+mn-ea"/>
+          <a:cs typeface="+mn-cs"/>
+        </a:defRPr>
+      </a:lvl7pPr>
+      <a:lvl8pPr marL="3200284" algn="l" defTabSz="914367" rtl="0" eaLnBrk="1" latinLnBrk="0" hangingPunct="1">
+        <a:defRPr sz="1765" kern="1200">
+          <a:solidFill>
+            <a:schemeClr val="tx1"/>
+          </a:solidFill>
+          <a:latin typeface="+mn-lt"/>
+          <a:ea typeface="+mn-ea"/>
+          <a:cs typeface="+mn-cs"/>
+        </a:defRPr>
+      </a:lvl8pPr>
+      <a:lvl9pPr marL="3657469" algn="l" defTabSz="914367" rtl="0" eaLnBrk="1" latinLnBrk="0" hangingPunct="1">
+        <a:defRPr sz="1765" kern="1200">
+          <a:solidFill>
+            <a:schemeClr val="tx1"/>
+          </a:solidFill>
+          <a:latin typeface="+mn-lt"/>
+          <a:ea typeface="+mn-ea"/>
+          <a:cs typeface="+mn-cs"/>
+        </a:defRPr>
+      </a:lvl9pPr>
+    </p:otherStyle>
+  </p:txStyles>
+  <p:extLst mod="1">
+    <p:ext uri="{27BBF7A9-308A-43DC-89C8-2F10F3537804}">
+      <p15:sldGuideLst xmlns:p15="http://schemas.microsoft.com/office/powerpoint/2012/main">
+        <p15:guide id="1" orient="horz" pos="187">
+          <p15:clr>
+            <a:srgbClr val="5ACBF0"/>
+          </p15:clr>
+        </p15:guide>
+        <p15:guide id="2" pos="173">
+          <p15:clr>
+            <a:srgbClr val="5ACBF0"/>
+          </p15:clr>
+        </p15:guide>
+        <p15:guide id="3" pos="749">
+          <p15:clr>
+            <a:srgbClr val="5ACBF0"/>
+          </p15:clr>
+        </p15:guide>
+        <p15:guide id="4" pos="1325">
+          <p15:clr>
+            <a:srgbClr val="5ACBF0"/>
+          </p15:clr>
+        </p15:guide>
+        <p15:guide id="5" pos="1901">
+          <p15:clr>
+            <a:srgbClr val="5ACBF0"/>
+          </p15:clr>
+        </p15:guide>
+        <p15:guide id="6" pos="2477">
+          <p15:clr>
+            <a:srgbClr val="5ACBF0"/>
+          </p15:clr>
+        </p15:guide>
+        <p15:guide id="7" pos="3053">
+          <p15:clr>
+            <a:srgbClr val="5ACBF0"/>
+          </p15:clr>
+        </p15:guide>
+        <p15:guide id="8" pos="3629">
+          <p15:clr>
+            <a:srgbClr val="5ACBF0"/>
+          </p15:clr>
+        </p15:guide>
+        <p15:guide id="9" pos="4205">
+          <p15:clr>
+            <a:srgbClr val="5ACBF0"/>
+          </p15:clr>
+        </p15:guide>
+        <p15:guide id="10" pos="4781">
+          <p15:clr>
+            <a:srgbClr val="5ACBF0"/>
+          </p15:clr>
+        </p15:guide>
+        <p15:guide id="11" pos="5357">
+          <p15:clr>
+            <a:srgbClr val="5ACBF0"/>
+          </p15:clr>
+        </p15:guide>
+        <p15:guide id="12" pos="5933">
+          <p15:clr>
+            <a:srgbClr val="5ACBF0"/>
+          </p15:clr>
+        </p15:guide>
+        <p15:guide id="13" pos="6509">
+          <p15:clr>
+            <a:srgbClr val="5ACBF0"/>
+          </p15:clr>
+        </p15:guide>
+        <p15:guide id="14" pos="7085">
+          <p15:clr>
+            <a:srgbClr val="5ACBF0"/>
+          </p15:clr>
+        </p15:guide>
+        <p15:guide id="15" pos="7661">
+          <p15:clr>
+            <a:srgbClr val="5ACBF0"/>
+          </p15:clr>
+        </p15:guide>
+        <p15:guide id="16" pos="288">
+          <p15:clr>
+            <a:srgbClr val="C35EA4"/>
+          </p15:clr>
+        </p15:guide>
+        <p15:guide id="17" pos="7546">
+          <p15:clr>
+            <a:srgbClr val="C35EA4"/>
+          </p15:clr>
+        </p15:guide>
+        <p15:guide id="18" orient="horz" pos="763">
+          <p15:clr>
+            <a:srgbClr val="5ACBF0"/>
+          </p15:clr>
+        </p15:guide>
+        <p15:guide id="19" orient="horz" pos="1339">
+          <p15:clr>
+            <a:srgbClr val="5ACBF0"/>
+          </p15:clr>
+        </p15:guide>
+        <p15:guide id="20" orient="horz" pos="1915">
+          <p15:clr>
+            <a:srgbClr val="5ACBF0"/>
+          </p15:clr>
+        </p15:guide>
+        <p15:guide id="21" orient="horz" pos="2491">
+          <p15:clr>
+            <a:srgbClr val="5ACBF0"/>
+          </p15:clr>
+        </p15:guide>
+        <p15:guide id="22" orient="horz" pos="3067">
+          <p15:clr>
+            <a:srgbClr val="5ACBF0"/>
+          </p15:clr>
+        </p15:guide>
+        <p15:guide id="23" orient="horz" pos="3643">
+          <p15:clr>
+            <a:srgbClr val="5ACBF0"/>
+          </p15:clr>
+        </p15:guide>
+        <p15:guide id="24" orient="horz" pos="4219">
+          <p15:clr>
+            <a:srgbClr val="5ACBF0"/>
+          </p15:clr>
+        </p15:guide>
+        <p15:guide id="25" orient="horz" pos="302">
+          <p15:clr>
+            <a:srgbClr val="C35EA4"/>
+          </p15:clr>
+        </p15:guide>
+        <p15:guide id="26" orient="horz" pos="4104">
+          <p15:clr>
+            <a:srgbClr val="C35EA4"/>
+          </p15:clr>
+        </p15:guide>
+      </p15:sldGuideLst>
+    </p:ext>
+  </p:extLst>
+</p:sldMaster>
+</file>
+
 <file path=ppt/slides/slide1.xml><?xml version="1.0" encoding="utf-8"?>
 <p:sld xmlns:a="http://schemas.openxmlformats.org/drawingml/2006/main" xmlns:r="http://schemas.openxmlformats.org/officeDocument/2006/relationships" xmlns:p="http://schemas.openxmlformats.org/presentationml/2006/main">
   <p:cSld>
@@ -8740,67 +10587,28 @@
           <a:chExt cx="0" cy="0"/>
         </a:xfrm>
       </p:grpSpPr>
-      <p:pic>
-        <p:nvPicPr>
-          <p:cNvPr id="5" name="Picture 4">
-            <a:extLst>
-              <a:ext uri="{FF2B5EF4-FFF2-40B4-BE49-F238E27FC236}">
-                <a16:creationId xmlns:a16="http://schemas.microsoft.com/office/drawing/2014/main" id="{C0FEE71E-ED63-4512-8AFC-EC9AA5788136}"/>
-              </a:ext>
-            </a:extLst>
-          </p:cNvPr>
-          <p:cNvPicPr>
-            <a:picLocks noChangeAspect="1"/>
-          </p:cNvPicPr>
-          <p:nvPr/>
-        </p:nvPicPr>
-        <p:blipFill>
-          <a:blip r:embed="rId3">
-            <a:extLst>
-              <a:ext uri="{28A0092B-C50C-407E-A947-70E740481C1C}">
-                <a14:useLocalDpi xmlns:a14="http://schemas.microsoft.com/office/drawing/2010/main" val="0"/>
-              </a:ext>
-            </a:extLst>
-          </a:blip>
-          <a:stretch>
-            <a:fillRect/>
-          </a:stretch>
-        </p:blipFill>
-        <p:spPr>
-          <a:xfrm>
-            <a:off x="0" y="0"/>
-            <a:ext cx="12192000" cy="6858000"/>
-          </a:xfrm>
-          <a:prstGeom prst="rect">
-            <a:avLst/>
-          </a:prstGeom>
-        </p:spPr>
-      </p:pic>
-      <p:sp>
-        <p:nvSpPr>
-          <p:cNvPr id="2" name="Title 1">
-            <a:extLst>
-              <a:ext uri="{FF2B5EF4-FFF2-40B4-BE49-F238E27FC236}">
-                <a16:creationId xmlns:a16="http://schemas.microsoft.com/office/drawing/2014/main" id="{D24276F2-0317-488E-BF36-A531A27FCA1F}"/>
-              </a:ext>
-            </a:extLst>
-          </p:cNvPr>
+      <p:sp>
+        <p:nvSpPr>
+          <p:cNvPr id="4" name="Title 3"/>
           <p:cNvSpPr>
             <a:spLocks noGrp="1"/>
           </p:cNvSpPr>
           <p:nvPr>
-            <p:ph type="ctrTitle"/>
+            <p:ph type="title"/>
           </p:nvPr>
         </p:nvSpPr>
-        <p:spPr/>
+        <p:spPr>
+          <a:xfrm>
+            <a:off x="358944" y="1367245"/>
+            <a:ext cx="8964185" cy="1792836"/>
+          </a:xfrm>
+        </p:spPr>
         <p:txBody>
           <a:bodyPr/>
           <a:lstStyle/>
           <a:p>
             <a:r>
-              <a:rPr lang="en-US" sz="11500" dirty="0">
-                <a:latin typeface="+mj-lt"/>
-              </a:rPr>
+              <a:rPr lang="en-US" dirty="0"/>
               <a:t>.NET Standard</a:t>
             </a:r>
           </a:p>
@@ -8808,46 +10616,54 @@
       </p:sp>
       <p:sp>
         <p:nvSpPr>
-          <p:cNvPr id="3" name="Subtitle 2">
-            <a:extLst>
-              <a:ext uri="{FF2B5EF4-FFF2-40B4-BE49-F238E27FC236}">
-                <a16:creationId xmlns:a16="http://schemas.microsoft.com/office/drawing/2014/main" id="{B84475FC-98A5-4892-B08B-922897C8E534}"/>
-              </a:ext>
-            </a:extLst>
-          </p:cNvPr>
+          <p:cNvPr id="6" name="Text Placeholder 4"/>
           <p:cNvSpPr>
             <a:spLocks noGrp="1"/>
           </p:cNvSpPr>
           <p:nvPr>
-            <p:ph type="subTitle" idx="1"/>
+            <p:ph type="body" sz="quarter" idx="12"/>
           </p:nvPr>
         </p:nvSpPr>
-        <p:spPr/>
+        <p:spPr>
+          <a:xfrm>
+            <a:off x="448585" y="3429000"/>
+            <a:ext cx="4482124" cy="1643445"/>
+          </a:xfrm>
+        </p:spPr>
         <p:txBody>
-          <a:bodyPr>
-            <a:normAutofit/>
-          </a:bodyPr>
+          <a:bodyPr/>
           <a:lstStyle/>
           <a:p>
             <a:r>
-              <a:rPr lang="en-US" sz="5400" dirty="0">
-                <a:latin typeface="+mj-lt"/>
-              </a:rPr>
-              <a:t>Deep Dive</a:t>
-            </a:r>
+              <a:rPr lang="en-US" dirty="0"/>
+              <a:t>Speaker Name</a:t>
+            </a:r>
+            <a:endParaRPr lang="en-US" sz="2745" dirty="0"/>
           </a:p>
         </p:txBody>
       </p:sp>
     </p:spTree>
     <p:extLst>
       <p:ext uri="{BB962C8B-B14F-4D97-AF65-F5344CB8AC3E}">
-        <p14:creationId xmlns:p14="http://schemas.microsoft.com/office/powerpoint/2010/main" val="3228576865"/>
+        <p14:creationId xmlns:p14="http://schemas.microsoft.com/office/powerpoint/2010/main" val="2760755950"/>
       </p:ext>
     </p:extLst>
   </p:cSld>
   <p:clrMapOvr>
     <a:masterClrMapping/>
   </p:clrMapOvr>
+  <mc:AlternateContent xmlns:mc="http://schemas.openxmlformats.org/markup-compatibility/2006" xmlns:p14="http://schemas.microsoft.com/office/powerpoint/2010/main">
+    <mc:Choice Requires="p14">
+      <p:transition spd="med" p14:dur="700">
+        <p:fade/>
+      </p:transition>
+    </mc:Choice>
+    <mc:Fallback xmlns="">
+      <p:transition spd="med">
+        <p:fade/>
+      </p:transition>
+    </mc:Fallback>
+  </mc:AlternateContent>
 </p:sld>
 </file>
 
@@ -31779,6 +33595,308 @@
 </file>
 
 <file path=ppt/theme/theme2.xml><?xml version="1.0" encoding="utf-8"?>
+<a:theme xmlns:a="http://schemas.openxmlformats.org/drawingml/2006/main" name="5-50111_Build 2017_DARK GRAY TEMPLATE">
+  <a:themeElements>
+    <a:clrScheme name="Build 2017 Colors (Dark Gray)">
+      <a:dk1>
+        <a:srgbClr val="505050"/>
+      </a:dk1>
+      <a:lt1>
+        <a:srgbClr val="FFFFFF"/>
+      </a:lt1>
+      <a:dk2>
+        <a:srgbClr val="0078D7"/>
+      </a:dk2>
+      <a:lt2>
+        <a:srgbClr val="EAEAEA"/>
+      </a:lt2>
+      <a:accent1>
+        <a:srgbClr val="0078D7"/>
+      </a:accent1>
+      <a:accent2>
+        <a:srgbClr val="00BCF2"/>
+      </a:accent2>
+      <a:accent3>
+        <a:srgbClr val="EAEAEA"/>
+      </a:accent3>
+      <a:accent4>
+        <a:srgbClr val="002050"/>
+      </a:accent4>
+      <a:accent5>
+        <a:srgbClr val="FFB900"/>
+      </a:accent5>
+      <a:accent6>
+        <a:srgbClr val="737373"/>
+      </a:accent6>
+      <a:hlink>
+        <a:srgbClr val="00BCF2"/>
+      </a:hlink>
+      <a:folHlink>
+        <a:srgbClr val="00BCF2"/>
+      </a:folHlink>
+    </a:clrScheme>
+    <a:fontScheme name="Segoe UI Light - Segoe UI Semilight">
+      <a:majorFont>
+        <a:latin typeface="Segoe UI Light"/>
+        <a:ea typeface=""/>
+        <a:cs typeface=""/>
+      </a:majorFont>
+      <a:minorFont>
+        <a:latin typeface="Segoe UI Semilight"/>
+        <a:ea typeface=""/>
+        <a:cs typeface=""/>
+      </a:minorFont>
+    </a:fontScheme>
+    <a:fmtScheme name="Couture">
+      <a:fillStyleLst>
+        <a:solidFill>
+          <a:schemeClr val="phClr"/>
+        </a:solidFill>
+        <a:solidFill>
+          <a:schemeClr val="phClr">
+            <a:tint val="65000"/>
+          </a:schemeClr>
+        </a:solidFill>
+        <a:solidFill>
+          <a:schemeClr val="phClr">
+            <a:shade val="80000"/>
+            <a:satMod val="180000"/>
+          </a:schemeClr>
+        </a:solidFill>
+      </a:fillStyleLst>
+      <a:lnStyleLst>
+        <a:ln w="9525" cap="flat" cmpd="sng" algn="ctr">
+          <a:solidFill>
+            <a:schemeClr val="phClr"/>
+          </a:solidFill>
+          <a:prstDash val="solid"/>
+        </a:ln>
+        <a:ln w="10795" cap="flat" cmpd="sng" algn="ctr">
+          <a:solidFill>
+            <a:schemeClr val="phClr"/>
+          </a:solidFill>
+          <a:prstDash val="solid"/>
+        </a:ln>
+        <a:ln w="17145" cap="flat" cmpd="sng" algn="ctr">
+          <a:solidFill>
+            <a:schemeClr val="phClr">
+              <a:shade val="95000"/>
+              <a:alpha val="50000"/>
+              <a:satMod val="150000"/>
+            </a:schemeClr>
+          </a:solidFill>
+          <a:prstDash val="solid"/>
+        </a:ln>
+      </a:lnStyleLst>
+      <a:effectStyleLst>
+        <a:effectStyle>
+          <a:effectLst/>
+        </a:effectStyle>
+        <a:effectStyle>
+          <a:effectLst/>
+        </a:effectStyle>
+        <a:effectStyle>
+          <a:effectLst>
+            <a:outerShdw blurRad="44450" dist="13970" dir="5400000" algn="ctr" rotWithShape="0">
+              <a:srgbClr val="000000">
+                <a:alpha val="45000"/>
+              </a:srgbClr>
+            </a:outerShdw>
+          </a:effectLst>
+          <a:scene3d>
+            <a:camera prst="orthographicFront">
+              <a:rot lat="0" lon="0" rev="0"/>
+            </a:camera>
+            <a:lightRig rig="twoPt" dir="tl"/>
+          </a:scene3d>
+          <a:sp3d prstMaterial="flat">
+            <a:bevelT w="19050" h="31750" prst="coolSlant"/>
+          </a:sp3d>
+        </a:effectStyle>
+      </a:effectStyleLst>
+      <a:bgFillStyleLst>
+        <a:solidFill>
+          <a:schemeClr val="phClr"/>
+        </a:solidFill>
+        <a:gradFill rotWithShape="1">
+          <a:gsLst>
+            <a:gs pos="0">
+              <a:schemeClr val="phClr">
+                <a:tint val="40000"/>
+                <a:satMod val="350000"/>
+              </a:schemeClr>
+            </a:gs>
+            <a:gs pos="40000">
+              <a:schemeClr val="phClr">
+                <a:tint val="45000"/>
+                <a:shade val="99000"/>
+                <a:satMod val="350000"/>
+              </a:schemeClr>
+            </a:gs>
+            <a:gs pos="100000">
+              <a:schemeClr val="phClr">
+                <a:shade val="20000"/>
+                <a:satMod val="255000"/>
+              </a:schemeClr>
+            </a:gs>
+          </a:gsLst>
+          <a:path path="circle">
+            <a:fillToRect l="50000" t="-80000" r="50000" b="180000"/>
+          </a:path>
+        </a:gradFill>
+        <a:gradFill rotWithShape="1">
+          <a:gsLst>
+            <a:gs pos="0">
+              <a:schemeClr val="phClr">
+                <a:tint val="80000"/>
+                <a:satMod val="300000"/>
+              </a:schemeClr>
+            </a:gs>
+            <a:gs pos="100000">
+              <a:schemeClr val="phClr">
+                <a:shade val="30000"/>
+                <a:satMod val="200000"/>
+              </a:schemeClr>
+            </a:gs>
+          </a:gsLst>
+          <a:path path="circle">
+            <a:fillToRect l="50000" t="50000" r="50000" b="50000"/>
+          </a:path>
+        </a:gradFill>
+      </a:bgFillStyleLst>
+    </a:fmtScheme>
+  </a:themeElements>
+  <a:objectDefaults>
+    <a:spDef>
+      <a:spPr bwMode="auto">
+        <a:solidFill>
+          <a:schemeClr val="accent1"/>
+        </a:solidFill>
+        <a:ln>
+          <a:noFill/>
+          <a:headEnd type="none" w="med" len="med"/>
+          <a:tailEnd type="none" w="med" len="med"/>
+        </a:ln>
+        <a:effectLst/>
+      </a:spPr>
+      <a:bodyPr rot="0" spcFirstLastPara="0" vertOverflow="overflow" horzOverflow="overflow" vert="horz" wrap="square" lIns="182880" tIns="146304" rIns="182880" bIns="146304" numCol="1" spcCol="0" rtlCol="0" fromWordArt="0" anchor="t" anchorCtr="0" forceAA="0" compatLnSpc="1">
+        <a:prstTxWarp prst="textNoShape">
+          <a:avLst/>
+        </a:prstTxWarp>
+        <a:noAutofit/>
+      </a:bodyPr>
+      <a:lstStyle>
+        <a:defPPr defTabSz="932472" fontAlgn="base">
+          <a:lnSpc>
+            <a:spcPct val="90000"/>
+          </a:lnSpc>
+          <a:spcBef>
+            <a:spcPct val="0"/>
+          </a:spcBef>
+          <a:spcAft>
+            <a:spcPct val="0"/>
+          </a:spcAft>
+          <a:defRPr sz="2400" dirty="0" err="1" smtClean="0">
+            <a:gradFill>
+              <a:gsLst>
+                <a:gs pos="0">
+                  <a:srgbClr val="FFFFFF"/>
+                </a:gs>
+                <a:gs pos="100000">
+                  <a:srgbClr val="FFFFFF"/>
+                </a:gs>
+              </a:gsLst>
+              <a:lin ang="5400000" scaled="0"/>
+            </a:gradFill>
+            <a:ea typeface="Segoe UI" pitchFamily="34" charset="0"/>
+            <a:cs typeface="Segoe UI" pitchFamily="34" charset="0"/>
+          </a:defRPr>
+        </a:defPPr>
+      </a:lstStyle>
+      <a:style>
+        <a:lnRef idx="1">
+          <a:schemeClr val="accent2"/>
+        </a:lnRef>
+        <a:fillRef idx="3">
+          <a:schemeClr val="accent2"/>
+        </a:fillRef>
+        <a:effectRef idx="2">
+          <a:schemeClr val="accent2"/>
+        </a:effectRef>
+        <a:fontRef idx="minor">
+          <a:schemeClr val="lt1"/>
+        </a:fontRef>
+      </a:style>
+    </a:spDef>
+    <a:lnDef>
+      <a:spPr>
+        <a:ln>
+          <a:solidFill>
+            <a:schemeClr val="tx1"/>
+          </a:solidFill>
+          <a:headEnd type="none"/>
+          <a:tailEnd type="none"/>
+        </a:ln>
+      </a:spPr>
+      <a:bodyPr/>
+      <a:lstStyle/>
+      <a:style>
+        <a:lnRef idx="1">
+          <a:schemeClr val="accent1"/>
+        </a:lnRef>
+        <a:fillRef idx="0">
+          <a:schemeClr val="accent1"/>
+        </a:fillRef>
+        <a:effectRef idx="0">
+          <a:schemeClr val="accent1"/>
+        </a:effectRef>
+        <a:fontRef idx="minor">
+          <a:schemeClr val="tx1"/>
+        </a:fontRef>
+      </a:style>
+    </a:lnDef>
+    <a:txDef>
+      <a:spPr>
+        <a:noFill/>
+      </a:spPr>
+      <a:bodyPr wrap="square" lIns="182880" tIns="146304" rIns="182880" bIns="146304" rtlCol="0">
+        <a:spAutoFit/>
+      </a:bodyPr>
+      <a:lstStyle>
+        <a:defPPr>
+          <a:lnSpc>
+            <a:spcPct val="90000"/>
+          </a:lnSpc>
+          <a:spcAft>
+            <a:spcPts val="600"/>
+          </a:spcAft>
+          <a:defRPr sz="2400" dirty="0" err="1" smtClean="0">
+            <a:gradFill>
+              <a:gsLst>
+                <a:gs pos="2917">
+                  <a:schemeClr val="tx1"/>
+                </a:gs>
+                <a:gs pos="30000">
+                  <a:schemeClr val="tx1"/>
+                </a:gs>
+              </a:gsLst>
+              <a:lin ang="5400000" scaled="0"/>
+            </a:gradFill>
+          </a:defRPr>
+        </a:defPPr>
+      </a:lstStyle>
+    </a:txDef>
+  </a:objectDefaults>
+  <a:extraClrSchemeLst/>
+  <a:extLst>
+    <a:ext uri="{05A4C25C-085E-4340-85A3-A5531E510DB2}">
+      <thm15:themeFamily xmlns:thm15="http://schemas.microsoft.com/office/thememl/2012/main" name="Microsoft_Build2017_Template.potx" id="{5417D3E2-C3A5-48BF-8802-FB8B38AE9E9C}" vid="{D138E69B-724A-4446-A2DA-FF3B08B1663E}"/>
+    </a:ext>
+  </a:extLst>
+</a:theme>
+</file>
+
+<file path=ppt/theme/theme3.xml><?xml version="1.0" encoding="utf-8"?>
 <a:theme xmlns:a="http://schemas.openxmlformats.org/drawingml/2006/main" name="Office Theme">
   <a:themeElements>
     <a:clrScheme name="Office">

</xml_diff>